<commit_message>
Lisätty parempi kuva prosesseista ja tietoa lokeista
</commit_message>
<xml_diff>
--- a/src/2. Admin toiminnot.pptx
+++ b/src/2. Admin toiminnot.pptx
@@ -5,45 +5,48 @@
     <p:sldMasterId id="2147483939" r:id="rId1"/>
   </p:sldMasterIdLst>
   <p:notesMasterIdLst>
-    <p:notesMasterId r:id="rId11"/>
+    <p:notesMasterId r:id="rId14"/>
   </p:notesMasterIdLst>
   <p:handoutMasterIdLst>
-    <p:handoutMasterId r:id="rId12"/>
+    <p:handoutMasterId r:id="rId15"/>
   </p:handoutMasterIdLst>
   <p:sldIdLst>
     <p:sldId id="274" r:id="rId2"/>
     <p:sldId id="273" r:id="rId3"/>
     <p:sldId id="275" r:id="rId4"/>
-    <p:sldId id="272" r:id="rId5"/>
-    <p:sldId id="276" r:id="rId6"/>
-    <p:sldId id="277" r:id="rId7"/>
-    <p:sldId id="281" r:id="rId8"/>
-    <p:sldId id="282" r:id="rId9"/>
-    <p:sldId id="283" r:id="rId10"/>
+    <p:sldId id="284" r:id="rId5"/>
+    <p:sldId id="285" r:id="rId6"/>
+    <p:sldId id="272" r:id="rId7"/>
+    <p:sldId id="276" r:id="rId8"/>
+    <p:sldId id="277" r:id="rId9"/>
+    <p:sldId id="281" r:id="rId10"/>
+    <p:sldId id="282" r:id="rId11"/>
+    <p:sldId id="283" r:id="rId12"/>
+    <p:sldId id="286" r:id="rId13"/>
   </p:sldIdLst>
   <p:sldSz cx="12192000" cy="6858000"/>
   <p:notesSz cx="6858000" cy="9144000"/>
   <p:embeddedFontLst>
     <p:embeddedFont>
       <p:font typeface="Corbel" panose="020B0503020204020204" pitchFamily="34" charset="0"/>
-      <p:regular r:id="rId13"/>
-      <p:bold r:id="rId14"/>
-      <p:italic r:id="rId15"/>
-      <p:boldItalic r:id="rId16"/>
+      <p:regular r:id="rId16"/>
+      <p:bold r:id="rId17"/>
+      <p:italic r:id="rId18"/>
+      <p:boldItalic r:id="rId19"/>
     </p:embeddedFont>
     <p:embeddedFont>
       <p:font typeface="Calibri" panose="020F0502020204030204" pitchFamily="34" charset="0"/>
-      <p:regular r:id="rId17"/>
-      <p:bold r:id="rId18"/>
-      <p:italic r:id="rId19"/>
-      <p:boldItalic r:id="rId20"/>
+      <p:regular r:id="rId20"/>
+      <p:bold r:id="rId21"/>
+      <p:italic r:id="rId22"/>
+      <p:boldItalic r:id="rId23"/>
     </p:embeddedFont>
     <p:embeddedFont>
       <p:font typeface="Consolas" panose="020B0609020204030204" pitchFamily="49" charset="0"/>
-      <p:regular r:id="rId21"/>
-      <p:bold r:id="rId22"/>
-      <p:italic r:id="rId23"/>
-      <p:boldItalic r:id="rId24"/>
+      <p:regular r:id="rId24"/>
+      <p:bold r:id="rId25"/>
+      <p:italic r:id="rId26"/>
+      <p:boldItalic r:id="rId27"/>
     </p:embeddedFont>
   </p:embeddedFontLst>
   <p:defaultTextStyle>
@@ -1085,7 +1088,7 @@
             <a:fld id="{EFBBD0BE-B288-474F-9C6B-4E107C6BAA38}" type="slidenum">
               <a:rPr lang="fi-FI" smtClean="0"/>
               <a:pPr/>
-              <a:t>4</a:t>
+              <a:t>6</a:t>
             </a:fld>
             <a:endParaRPr lang="fi-FI"/>
           </a:p>
@@ -15596,963 +15599,7 @@
 </p:sld>
 </file>
 
-<file path=ppt/slides/slide2.xml><?xml version="1.0" encoding="utf-8"?>
-<p:sld xmlns:a="http://schemas.openxmlformats.org/drawingml/2006/main" xmlns:r="http://schemas.openxmlformats.org/officeDocument/2006/relationships" xmlns:p="http://schemas.openxmlformats.org/presentationml/2006/main">
-  <p:cSld>
-    <p:spTree>
-      <p:nvGrpSpPr>
-        <p:cNvPr id="1" name=""/>
-        <p:cNvGrpSpPr/>
-        <p:nvPr/>
-      </p:nvGrpSpPr>
-      <p:grpSpPr>
-        <a:xfrm>
-          <a:off x="0" y="0"/>
-          <a:ext cx="0" cy="0"/>
-          <a:chOff x="0" y="0"/>
-          <a:chExt cx="0" cy="0"/>
-        </a:xfrm>
-      </p:grpSpPr>
-      <p:sp>
-        <p:nvSpPr>
-          <p:cNvPr id="3" name="Otsikko 2"/>
-          <p:cNvSpPr>
-            <a:spLocks noGrp="1"/>
-          </p:cNvSpPr>
-          <p:nvPr>
-            <p:ph type="title"/>
-          </p:nvPr>
-        </p:nvSpPr>
-        <p:spPr/>
-        <p:txBody>
-          <a:bodyPr/>
-          <a:lstStyle/>
-          <a:p>
-            <a:r>
-              <a:rPr lang="fi-FI" dirty="0" err="1"/>
-              <a:t>Backup</a:t>
-            </a:r>
-            <a:r>
-              <a:rPr lang="fi-FI" dirty="0"/>
-              <a:t> / </a:t>
-            </a:r>
-            <a:r>
-              <a:rPr lang="fi-FI" dirty="0" err="1"/>
-              <a:t>restore</a:t>
-            </a:r>
-            <a:endParaRPr lang="fi-FI" dirty="0"/>
-          </a:p>
-        </p:txBody>
-      </p:sp>
-      <p:sp>
-        <p:nvSpPr>
-          <p:cNvPr id="2" name="Sisällön paikkamerkki 1"/>
-          <p:cNvSpPr>
-            <a:spLocks noGrp="1"/>
-          </p:cNvSpPr>
-          <p:nvPr>
-            <p:ph idx="13"/>
-          </p:nvPr>
-        </p:nvSpPr>
-        <p:spPr>
-          <a:xfrm>
-            <a:off x="907649" y="2772609"/>
-            <a:ext cx="5018590" cy="2714539"/>
-          </a:xfrm>
-        </p:spPr>
-        <p:txBody>
-          <a:bodyPr/>
-          <a:lstStyle/>
-          <a:p>
-            <a:r>
-              <a:rPr lang="fi-FI" dirty="0"/>
-              <a:t>Tallentaa liityntäpalvelimen konfiguraation, myös avaimet ja varmenteet</a:t>
-            </a:r>
-          </a:p>
-          <a:p>
-            <a:endParaRPr lang="fi-FI" dirty="0"/>
-          </a:p>
-        </p:txBody>
-      </p:sp>
-      <p:pic>
-        <p:nvPicPr>
-          <p:cNvPr id="6" name="Picture 4"/>
-          <p:cNvPicPr>
-            <a:picLocks noGrp="1" noChangeAspect="1"/>
-          </p:cNvPicPr>
-          <p:nvPr>
-            <p:ph idx="14"/>
-          </p:nvPr>
-        </p:nvPicPr>
-        <p:blipFill>
-          <a:blip r:embed="rId2"/>
-          <a:stretch>
-            <a:fillRect/>
-          </a:stretch>
-        </p:blipFill>
-        <p:spPr>
-          <a:xfrm>
-            <a:off x="5926239" y="2473459"/>
-            <a:ext cx="5770913" cy="3312841"/>
-          </a:xfrm>
-          <a:prstGeom prst="rect">
-            <a:avLst/>
-          </a:prstGeom>
-        </p:spPr>
-      </p:pic>
-    </p:spTree>
-    <p:extLst>
-      <p:ext uri="{BB962C8B-B14F-4D97-AF65-F5344CB8AC3E}">
-        <p14:creationId xmlns:p14="http://schemas.microsoft.com/office/powerpoint/2010/main" val="2463693408"/>
-      </p:ext>
-    </p:extLst>
-  </p:cSld>
-  <p:clrMapOvr>
-    <a:masterClrMapping/>
-  </p:clrMapOvr>
-</p:sld>
-</file>
-
-<file path=ppt/slides/slide3.xml><?xml version="1.0" encoding="utf-8"?>
-<p:sld xmlns:a="http://schemas.openxmlformats.org/drawingml/2006/main" xmlns:r="http://schemas.openxmlformats.org/officeDocument/2006/relationships" xmlns:p="http://schemas.openxmlformats.org/presentationml/2006/main">
-  <p:cSld>
-    <p:spTree>
-      <p:nvGrpSpPr>
-        <p:cNvPr id="1" name=""/>
-        <p:cNvGrpSpPr/>
-        <p:nvPr/>
-      </p:nvGrpSpPr>
-      <p:grpSpPr>
-        <a:xfrm>
-          <a:off x="0" y="0"/>
-          <a:ext cx="0" cy="0"/>
-          <a:chOff x="0" y="0"/>
-          <a:chExt cx="0" cy="0"/>
-        </a:xfrm>
-      </p:grpSpPr>
-      <p:sp>
-        <p:nvSpPr>
-          <p:cNvPr id="2" name="Sisällön paikkamerkki 1"/>
-          <p:cNvSpPr>
-            <a:spLocks noGrp="1"/>
-          </p:cNvSpPr>
-          <p:nvPr>
-            <p:ph idx="1"/>
-          </p:nvPr>
-        </p:nvSpPr>
-        <p:spPr>
-          <a:xfrm>
-            <a:off x="838200" y="2027124"/>
-            <a:ext cx="5096948" cy="4526615"/>
-          </a:xfrm>
-        </p:spPr>
-        <p:txBody>
-          <a:bodyPr/>
-          <a:lstStyle/>
-          <a:p>
-            <a:r>
-              <a:rPr lang="fi-FI" dirty="0"/>
-              <a:t>Kertoo toimiiko </a:t>
-            </a:r>
-            <a:r>
-              <a:rPr lang="fi-FI" b="1" dirty="0" err="1"/>
-              <a:t>global</a:t>
-            </a:r>
-            <a:r>
-              <a:rPr lang="fi-FI" b="1" dirty="0"/>
-              <a:t> </a:t>
-            </a:r>
-            <a:r>
-              <a:rPr lang="fi-FI" b="1" dirty="0" err="1"/>
-              <a:t>configuraation</a:t>
-            </a:r>
-            <a:r>
-              <a:rPr lang="fi-FI" b="1" dirty="0"/>
-              <a:t> haku </a:t>
-            </a:r>
-            <a:r>
-              <a:rPr lang="fi-FI" dirty="0"/>
-              <a:t>ja </a:t>
-            </a:r>
-            <a:r>
-              <a:rPr lang="fi-FI" b="1" dirty="0"/>
-              <a:t>yhteys aikaleimapalvelimelle</a:t>
-            </a:r>
-          </a:p>
-          <a:p>
-            <a:r>
-              <a:rPr lang="fi-FI" dirty="0"/>
-              <a:t>Myös lisää ominaisuuksia liityntäpalvelimen valvontaan (mm. SOAP palvelun avulla) ollaan julkaisemassa lähiaikoina</a:t>
-            </a:r>
-          </a:p>
-          <a:p>
-            <a:endParaRPr lang="fi-FI" dirty="0"/>
-          </a:p>
-        </p:txBody>
-      </p:sp>
-      <p:sp>
-        <p:nvSpPr>
-          <p:cNvPr id="3" name="Otsikko 2"/>
-          <p:cNvSpPr>
-            <a:spLocks noGrp="1"/>
-          </p:cNvSpPr>
-          <p:nvPr>
-            <p:ph type="title"/>
-          </p:nvPr>
-        </p:nvSpPr>
-        <p:spPr/>
-        <p:txBody>
-          <a:bodyPr/>
-          <a:lstStyle/>
-          <a:p>
-            <a:r>
-              <a:rPr lang="fi-FI" dirty="0"/>
-              <a:t>Diagnostiikka</a:t>
-            </a:r>
-          </a:p>
-        </p:txBody>
-      </p:sp>
-      <p:pic>
-        <p:nvPicPr>
-          <p:cNvPr id="4" name="Picture 1"/>
-          <p:cNvPicPr>
-            <a:picLocks noChangeAspect="1"/>
-          </p:cNvPicPr>
-          <p:nvPr/>
-        </p:nvPicPr>
-        <p:blipFill>
-          <a:blip r:embed="rId2"/>
-          <a:stretch>
-            <a:fillRect/>
-          </a:stretch>
-        </p:blipFill>
-        <p:spPr>
-          <a:xfrm>
-            <a:off x="5935148" y="2027124"/>
-            <a:ext cx="5773961" cy="3314592"/>
-          </a:xfrm>
-          <a:prstGeom prst="rect">
-            <a:avLst/>
-          </a:prstGeom>
-        </p:spPr>
-      </p:pic>
-    </p:spTree>
-    <p:extLst>
-      <p:ext uri="{BB962C8B-B14F-4D97-AF65-F5344CB8AC3E}">
-        <p14:creationId xmlns:p14="http://schemas.microsoft.com/office/powerpoint/2010/main" val="3503981542"/>
-      </p:ext>
-    </p:extLst>
-  </p:cSld>
-  <p:clrMapOvr>
-    <a:masterClrMapping/>
-  </p:clrMapOvr>
-</p:sld>
-</file>
-
-<file path=ppt/slides/slide4.xml><?xml version="1.0" encoding="utf-8"?>
-<p:sld xmlns:a="http://schemas.openxmlformats.org/drawingml/2006/main" xmlns:r="http://schemas.openxmlformats.org/officeDocument/2006/relationships" xmlns:p="http://schemas.openxmlformats.org/presentationml/2006/main">
-  <p:cSld>
-    <p:spTree>
-      <p:nvGrpSpPr>
-        <p:cNvPr id="1" name=""/>
-        <p:cNvGrpSpPr/>
-        <p:nvPr/>
-      </p:nvGrpSpPr>
-      <p:grpSpPr>
-        <a:xfrm>
-          <a:off x="0" y="0"/>
-          <a:ext cx="0" cy="0"/>
-          <a:chOff x="0" y="0"/>
-          <a:chExt cx="0" cy="0"/>
-        </a:xfrm>
-      </p:grpSpPr>
-      <p:sp>
-        <p:nvSpPr>
-          <p:cNvPr id="3" name="Otsikko 2"/>
-          <p:cNvSpPr>
-            <a:spLocks noGrp="1"/>
-          </p:cNvSpPr>
-          <p:nvPr>
-            <p:ph type="title"/>
-          </p:nvPr>
-        </p:nvSpPr>
-        <p:spPr/>
-        <p:txBody>
-          <a:bodyPr/>
-          <a:lstStyle/>
-          <a:p>
-            <a:r>
-              <a:rPr lang="fi-FI" dirty="0"/>
-              <a:t>Valvonta, prosessit ja portit</a:t>
-            </a:r>
-          </a:p>
-        </p:txBody>
-      </p:sp>
-      <p:pic>
-        <p:nvPicPr>
-          <p:cNvPr id="4" name="Sisällön paikkamerkki 3"/>
-          <p:cNvPicPr>
-            <a:picLocks noGrp="1" noChangeAspect="1"/>
-          </p:cNvPicPr>
-          <p:nvPr>
-            <p:ph idx="13"/>
-          </p:nvPr>
-        </p:nvPicPr>
-        <p:blipFill rotWithShape="1">
-          <a:blip r:embed="rId3" cstate="print">
-            <a:extLst>
-              <a:ext uri="{28A0092B-C50C-407E-A947-70E740481C1C}">
-                <a14:useLocalDpi xmlns:a14="http://schemas.microsoft.com/office/drawing/2010/main" val="0"/>
-              </a:ext>
-            </a:extLst>
-          </a:blip>
-          <a:srcRect l="1236" t="1331" r="1541" b="-1"/>
-          <a:stretch/>
-        </p:blipFill>
-        <p:spPr bwMode="auto">
-          <a:xfrm>
-            <a:off x="283580" y="1912717"/>
-            <a:ext cx="7320988" cy="4444004"/>
-          </a:xfrm>
-          <a:prstGeom prst="rect">
-            <a:avLst/>
-          </a:prstGeom>
-          <a:noFill/>
-          <a:extLst>
-            <a:ext uri="{909E8E84-426E-40DD-AFC4-6F175D3DCCD1}">
-              <a14:hiddenFill xmlns:a14="http://schemas.microsoft.com/office/drawing/2010/main">
-                <a:solidFill>
-                  <a:srgbClr val="FFFFFF"/>
-                </a:solidFill>
-              </a14:hiddenFill>
-            </a:ext>
-          </a:extLst>
-        </p:spPr>
-      </p:pic>
-      <p:sp>
-        <p:nvSpPr>
-          <p:cNvPr id="2" name="Sisällön paikkamerkki 1"/>
-          <p:cNvSpPr>
-            <a:spLocks noGrp="1"/>
-          </p:cNvSpPr>
-          <p:nvPr>
-            <p:ph idx="14"/>
-          </p:nvPr>
-        </p:nvSpPr>
-        <p:spPr>
-          <a:xfrm>
-            <a:off x="7564056" y="1990846"/>
-            <a:ext cx="4333754" cy="4287746"/>
-          </a:xfrm>
-        </p:spPr>
-        <p:txBody>
-          <a:bodyPr>
-            <a:normAutofit/>
-          </a:bodyPr>
-          <a:lstStyle/>
-          <a:p>
-            <a:r>
-              <a:rPr lang="fi-FI" sz="1600" b="1" dirty="0" err="1">
-                <a:solidFill>
-                  <a:schemeClr val="tx1"/>
-                </a:solidFill>
-              </a:rPr>
-              <a:t>xroad-confclient</a:t>
-            </a:r>
-            <a:r>
-              <a:rPr lang="fi-FI" sz="1600" dirty="0">
-                <a:solidFill>
-                  <a:schemeClr val="tx1"/>
-                </a:solidFill>
-              </a:rPr>
-              <a:t>: Global </a:t>
-            </a:r>
-            <a:r>
-              <a:rPr lang="fi-FI" sz="1600" dirty="0" err="1">
-                <a:solidFill>
-                  <a:schemeClr val="tx1"/>
-                </a:solidFill>
-              </a:rPr>
-              <a:t>conf</a:t>
-            </a:r>
-            <a:r>
-              <a:rPr lang="fi-FI" sz="1600" dirty="0">
-                <a:solidFill>
-                  <a:schemeClr val="tx1"/>
-                </a:solidFill>
-              </a:rPr>
-              <a:t> -konfiguraatiotietojen hausta keskuspalvelimelta vastaava asiakassovellus (</a:t>
-            </a:r>
-            <a:r>
-              <a:rPr lang="fi-FI" sz="1600" dirty="0" err="1">
-                <a:solidFill>
-                  <a:schemeClr val="tx1"/>
-                </a:solidFill>
-              </a:rPr>
-              <a:t>client</a:t>
-            </a:r>
-            <a:r>
-              <a:rPr lang="fi-FI" sz="1600" dirty="0">
-                <a:solidFill>
-                  <a:schemeClr val="tx1"/>
-                </a:solidFill>
-              </a:rPr>
-              <a:t>)</a:t>
-            </a:r>
-          </a:p>
-          <a:p>
-            <a:r>
-              <a:rPr lang="fi-FI" sz="1600" b="1" dirty="0" err="1">
-                <a:solidFill>
-                  <a:schemeClr val="tx1"/>
-                </a:solidFill>
-              </a:rPr>
-              <a:t>xroad-jetty</a:t>
-            </a:r>
-            <a:r>
-              <a:rPr lang="fi-FI" sz="1600" dirty="0">
-                <a:solidFill>
-                  <a:schemeClr val="tx1"/>
-                </a:solidFill>
-              </a:rPr>
-              <a:t>: Käyttöliittymän sovelluspalvelin</a:t>
-            </a:r>
-          </a:p>
-          <a:p>
-            <a:r>
-              <a:rPr lang="fi-FI" sz="1600" b="1" dirty="0" err="1">
-                <a:solidFill>
-                  <a:schemeClr val="tx1"/>
-                </a:solidFill>
-              </a:rPr>
-              <a:t>xroad-proxy</a:t>
-            </a:r>
-            <a:r>
-              <a:rPr lang="fi-FI" sz="1600" b="1" dirty="0">
-                <a:solidFill>
-                  <a:schemeClr val="tx1"/>
-                </a:solidFill>
-              </a:rPr>
-              <a:t>: </a:t>
-            </a:r>
-            <a:r>
-              <a:rPr lang="fi-FI" sz="1600" dirty="0">
-                <a:solidFill>
-                  <a:schemeClr val="tx1"/>
-                </a:solidFill>
-              </a:rPr>
-              <a:t>Liityntäpalvelinten välisestä sanomaliikenteestä vastaava komponentti</a:t>
-            </a:r>
-          </a:p>
-          <a:p>
-            <a:r>
-              <a:rPr lang="fi-FI" sz="1600" b="1" dirty="0" err="1">
-                <a:solidFill>
-                  <a:schemeClr val="tx1"/>
-                </a:solidFill>
-              </a:rPr>
-              <a:t>xroad-signer</a:t>
-            </a:r>
-            <a:r>
-              <a:rPr lang="fi-FI" sz="1600" b="1" dirty="0">
-                <a:solidFill>
-                  <a:schemeClr val="tx1"/>
-                </a:solidFill>
-              </a:rPr>
-              <a:t>: </a:t>
-            </a:r>
-            <a:r>
-              <a:rPr lang="fi-FI" sz="1600" dirty="0">
-                <a:solidFill>
-                  <a:schemeClr val="tx1"/>
-                </a:solidFill>
-              </a:rPr>
-              <a:t>Avainten hallinnasta ja mm. sanomien allekirjoituksesta sekä allekirjoitusten verifioinnista vastaava komponentti</a:t>
-            </a:r>
-          </a:p>
-          <a:p>
-            <a:r>
-              <a:rPr lang="fi-FI" sz="1600" b="1" dirty="0" err="1">
-                <a:solidFill>
-                  <a:schemeClr val="tx1"/>
-                </a:solidFill>
-              </a:rPr>
-              <a:t>Nginx</a:t>
-            </a:r>
-            <a:r>
-              <a:rPr lang="fi-FI" sz="1600" b="1" dirty="0">
-                <a:solidFill>
-                  <a:schemeClr val="tx1"/>
-                </a:solidFill>
-              </a:rPr>
-              <a:t>: </a:t>
-            </a:r>
-            <a:r>
-              <a:rPr lang="fi-FI" sz="1600" dirty="0">
-                <a:solidFill>
-                  <a:schemeClr val="tx1"/>
-                </a:solidFill>
-              </a:rPr>
-              <a:t>www-palvelin</a:t>
-            </a:r>
-          </a:p>
-          <a:p>
-            <a:r>
-              <a:rPr lang="fi-FI" sz="1600" b="1" dirty="0" err="1">
-                <a:solidFill>
-                  <a:schemeClr val="tx1"/>
-                </a:solidFill>
-              </a:rPr>
-              <a:t>PostgreSQL</a:t>
-            </a:r>
-            <a:r>
-              <a:rPr lang="fi-FI" sz="1600" b="1" dirty="0">
-                <a:solidFill>
-                  <a:schemeClr val="tx1"/>
-                </a:solidFill>
-              </a:rPr>
-              <a:t>: </a:t>
-            </a:r>
-            <a:r>
-              <a:rPr lang="fi-FI" sz="1600" dirty="0">
-                <a:solidFill>
-                  <a:schemeClr val="tx1"/>
-                </a:solidFill>
-              </a:rPr>
-              <a:t>relaatiokanta</a:t>
-            </a:r>
-            <a:endParaRPr lang="fi-FI" sz="1600" dirty="0"/>
-          </a:p>
-        </p:txBody>
-      </p:sp>
-    </p:spTree>
-    <p:extLst>
-      <p:ext uri="{BB962C8B-B14F-4D97-AF65-F5344CB8AC3E}">
-        <p14:creationId xmlns:p14="http://schemas.microsoft.com/office/powerpoint/2010/main" val="3352745462"/>
-      </p:ext>
-    </p:extLst>
-  </p:cSld>
-  <p:clrMapOvr>
-    <a:masterClrMapping/>
-  </p:clrMapOvr>
-</p:sld>
-</file>
-
-<file path=ppt/slides/slide5.xml><?xml version="1.0" encoding="utf-8"?>
-<p:sld xmlns:a="http://schemas.openxmlformats.org/drawingml/2006/main" xmlns:r="http://schemas.openxmlformats.org/officeDocument/2006/relationships" xmlns:p="http://schemas.openxmlformats.org/presentationml/2006/main">
-  <p:cSld>
-    <p:spTree>
-      <p:nvGrpSpPr>
-        <p:cNvPr id="1" name=""/>
-        <p:cNvGrpSpPr/>
-        <p:nvPr/>
-      </p:nvGrpSpPr>
-      <p:grpSpPr>
-        <a:xfrm>
-          <a:off x="0" y="0"/>
-          <a:ext cx="0" cy="0"/>
-          <a:chOff x="0" y="0"/>
-          <a:chExt cx="0" cy="0"/>
-        </a:xfrm>
-      </p:grpSpPr>
-      <p:sp>
-        <p:nvSpPr>
-          <p:cNvPr id="2" name="Sisällön paikkamerkki 1"/>
-          <p:cNvSpPr>
-            <a:spLocks noGrp="1"/>
-          </p:cNvSpPr>
-          <p:nvPr>
-            <p:ph idx="1"/>
-          </p:nvPr>
-        </p:nvSpPr>
-        <p:spPr/>
-        <p:txBody>
-          <a:bodyPr/>
-          <a:lstStyle/>
-          <a:p>
-            <a:r>
-              <a:rPr lang="fi-FI" dirty="0"/>
-              <a:t>Asennuksen mukana tulee komentorivityökalu </a:t>
-            </a:r>
-            <a:r>
-              <a:rPr lang="fi-FI" b="1" dirty="0" err="1"/>
-              <a:t>signer-console</a:t>
-            </a:r>
-            <a:r>
-              <a:rPr lang="fi-FI" dirty="0"/>
-              <a:t>, jolla PIN-koodin syöttö voidaan tehdä ilman </a:t>
-            </a:r>
-            <a:r>
-              <a:rPr lang="fi-FI" dirty="0" err="1"/>
-              <a:t>web</a:t>
-            </a:r>
-            <a:r>
-              <a:rPr lang="fi-FI" dirty="0"/>
-              <a:t> </a:t>
-            </a:r>
-            <a:r>
-              <a:rPr lang="fi-FI" dirty="0" err="1"/>
-              <a:t>admin</a:t>
-            </a:r>
-            <a:r>
-              <a:rPr lang="fi-FI" dirty="0"/>
-              <a:t> </a:t>
-            </a:r>
-            <a:r>
-              <a:rPr lang="fi-FI" dirty="0" err="1"/>
-              <a:t>UI:ta</a:t>
-            </a:r>
-            <a:endParaRPr lang="fi-FI" dirty="0"/>
-          </a:p>
-          <a:p>
-            <a:r>
-              <a:rPr lang="fi-FI" dirty="0"/>
-              <a:t>Näin voidaan automatisoida PIN-koodin syöttö palvelimen käynnistymisen yhteyteen</a:t>
-            </a:r>
-          </a:p>
-          <a:p>
-            <a:pPr lvl="1"/>
-            <a:r>
-              <a:rPr lang="fi-FI" dirty="0"/>
-              <a:t>Koodi syötettävä aina palvelimen uudelleenkäynnistyksen yhteydessä</a:t>
-            </a:r>
-          </a:p>
-        </p:txBody>
-      </p:sp>
-      <p:sp>
-        <p:nvSpPr>
-          <p:cNvPr id="3" name="Otsikko 2"/>
-          <p:cNvSpPr>
-            <a:spLocks noGrp="1"/>
-          </p:cNvSpPr>
-          <p:nvPr>
-            <p:ph type="title"/>
-          </p:nvPr>
-        </p:nvSpPr>
-        <p:spPr/>
-        <p:txBody>
-          <a:bodyPr/>
-          <a:lstStyle/>
-          <a:p>
-            <a:r>
-              <a:rPr lang="fi-FI" dirty="0"/>
-              <a:t>PIN-koodi</a:t>
-            </a:r>
-          </a:p>
-        </p:txBody>
-      </p:sp>
-    </p:spTree>
-    <p:extLst>
-      <p:ext uri="{BB962C8B-B14F-4D97-AF65-F5344CB8AC3E}">
-        <p14:creationId xmlns:p14="http://schemas.microsoft.com/office/powerpoint/2010/main" val="266621481"/>
-      </p:ext>
-    </p:extLst>
-  </p:cSld>
-  <p:clrMapOvr>
-    <a:masterClrMapping/>
-  </p:clrMapOvr>
-</p:sld>
-</file>
-
-<file path=ppt/slides/slide6.xml><?xml version="1.0" encoding="utf-8"?>
-<p:sld xmlns:a="http://schemas.openxmlformats.org/drawingml/2006/main" xmlns:r="http://schemas.openxmlformats.org/officeDocument/2006/relationships" xmlns:p="http://schemas.openxmlformats.org/presentationml/2006/main">
-  <p:cSld>
-    <p:spTree>
-      <p:nvGrpSpPr>
-        <p:cNvPr id="1" name=""/>
-        <p:cNvGrpSpPr/>
-        <p:nvPr/>
-      </p:nvGrpSpPr>
-      <p:grpSpPr>
-        <a:xfrm>
-          <a:off x="0" y="0"/>
-          <a:ext cx="0" cy="0"/>
-          <a:chOff x="0" y="0"/>
-          <a:chExt cx="0" cy="0"/>
-        </a:xfrm>
-      </p:grpSpPr>
-      <p:sp>
-        <p:nvSpPr>
-          <p:cNvPr id="2" name="Sisällön paikkamerkki 1"/>
-          <p:cNvSpPr>
-            <a:spLocks noGrp="1"/>
-          </p:cNvSpPr>
-          <p:nvPr>
-            <p:ph idx="1"/>
-          </p:nvPr>
-        </p:nvSpPr>
-        <p:spPr/>
-        <p:txBody>
-          <a:bodyPr/>
-          <a:lstStyle/>
-          <a:p>
-            <a:r>
-              <a:rPr lang="fi-FI" dirty="0"/>
-              <a:t>Parametrit ovat hakemistossa:</a:t>
-            </a:r>
-          </a:p>
-          <a:p>
-            <a:pPr marL="0" indent="0">
-              <a:buNone/>
-            </a:pPr>
-            <a:r>
-              <a:rPr lang="fi-FI" b="1" dirty="0"/>
-              <a:t>	</a:t>
-            </a:r>
-            <a:r>
-              <a:rPr lang="fi-FI" b="1" dirty="0">
-                <a:latin typeface="Courier New" panose="02070309020205020404" pitchFamily="49" charset="0"/>
-                <a:cs typeface="Courier New" panose="02070309020205020404" pitchFamily="49" charset="0"/>
-              </a:rPr>
-              <a:t>/</a:t>
-            </a:r>
-            <a:r>
-              <a:rPr lang="fi-FI" b="1" dirty="0" err="1">
-                <a:latin typeface="Courier New" panose="02070309020205020404" pitchFamily="49" charset="0"/>
-                <a:cs typeface="Courier New" panose="02070309020205020404" pitchFamily="49" charset="0"/>
-              </a:rPr>
-              <a:t>etc</a:t>
-            </a:r>
-            <a:r>
-              <a:rPr lang="fi-FI" b="1" dirty="0">
-                <a:latin typeface="Courier New" panose="02070309020205020404" pitchFamily="49" charset="0"/>
-                <a:cs typeface="Courier New" panose="02070309020205020404" pitchFamily="49" charset="0"/>
-              </a:rPr>
-              <a:t>/</a:t>
-            </a:r>
-            <a:r>
-              <a:rPr lang="fi-FI" b="1" dirty="0" err="1">
-                <a:latin typeface="Courier New" panose="02070309020205020404" pitchFamily="49" charset="0"/>
-                <a:cs typeface="Courier New" panose="02070309020205020404" pitchFamily="49" charset="0"/>
-              </a:rPr>
-              <a:t>xroad</a:t>
-            </a:r>
-            <a:r>
-              <a:rPr lang="fi-FI" b="1" dirty="0">
-                <a:latin typeface="Courier New" panose="02070309020205020404" pitchFamily="49" charset="0"/>
-                <a:cs typeface="Courier New" panose="02070309020205020404" pitchFamily="49" charset="0"/>
-              </a:rPr>
-              <a:t>/</a:t>
-            </a:r>
-            <a:r>
-              <a:rPr lang="fi-FI" b="1" dirty="0" err="1">
-                <a:latin typeface="Courier New" panose="02070309020205020404" pitchFamily="49" charset="0"/>
-                <a:cs typeface="Courier New" panose="02070309020205020404" pitchFamily="49" charset="0"/>
-              </a:rPr>
-              <a:t>conf.d</a:t>
-            </a:r>
-            <a:endParaRPr lang="fi-FI" dirty="0">
-              <a:latin typeface="Courier New" panose="02070309020205020404" pitchFamily="49" charset="0"/>
-              <a:cs typeface="Courier New" panose="02070309020205020404" pitchFamily="49" charset="0"/>
-            </a:endParaRPr>
-          </a:p>
-          <a:p>
-            <a:r>
-              <a:rPr lang="fi-FI" dirty="0"/>
-              <a:t>Parametreilla voidaan säätää esimerkiksi käytettyjä tallennushakemistoja ja </a:t>
-            </a:r>
-            <a:r>
-              <a:rPr lang="fi-FI" dirty="0" err="1"/>
-              <a:t>cron</a:t>
-            </a:r>
-            <a:r>
-              <a:rPr lang="fi-FI" dirty="0"/>
-              <a:t> ajastuksia mm. </a:t>
-            </a:r>
-            <a:r>
-              <a:rPr lang="fi-FI" dirty="0" err="1"/>
-              <a:t>messagelogien</a:t>
-            </a:r>
-            <a:r>
-              <a:rPr lang="fi-FI" dirty="0"/>
-              <a:t> purkamiseen kannasta</a:t>
-            </a:r>
-          </a:p>
-          <a:p>
-            <a:r>
-              <a:rPr lang="fi-FI" dirty="0"/>
-              <a:t>Omat parametrit eri komponenteille</a:t>
-            </a:r>
-          </a:p>
-          <a:p>
-            <a:pPr lvl="1"/>
-            <a:r>
-              <a:rPr lang="fi-FI" dirty="0"/>
-              <a:t>Proxy.ini, signer.ini, common.ini...</a:t>
-            </a:r>
-          </a:p>
-          <a:p>
-            <a:pPr lvl="1"/>
-            <a:r>
-              <a:rPr lang="fi-FI" dirty="0"/>
-              <a:t>Paikalliset muutokset tehdään</a:t>
-            </a:r>
-            <a:r>
-              <a:rPr lang="fi-FI" b="1" dirty="0"/>
-              <a:t> local.ini </a:t>
-            </a:r>
-            <a:r>
-              <a:rPr lang="fi-FI" dirty="0"/>
-              <a:t>tiedostoon</a:t>
-            </a:r>
-          </a:p>
-          <a:p>
-            <a:pPr marL="0" indent="0">
-              <a:buNone/>
-            </a:pPr>
-            <a:endParaRPr lang="fi-FI" dirty="0"/>
-          </a:p>
-        </p:txBody>
-      </p:sp>
-      <p:sp>
-        <p:nvSpPr>
-          <p:cNvPr id="3" name="Otsikko 2"/>
-          <p:cNvSpPr>
-            <a:spLocks noGrp="1"/>
-          </p:cNvSpPr>
-          <p:nvPr>
-            <p:ph type="title"/>
-          </p:nvPr>
-        </p:nvSpPr>
-        <p:spPr/>
-        <p:txBody>
-          <a:bodyPr/>
-          <a:lstStyle/>
-          <a:p>
-            <a:r>
-              <a:rPr lang="fi-FI" dirty="0"/>
-              <a:t>Konfiguraatioparametrit</a:t>
-            </a:r>
-          </a:p>
-        </p:txBody>
-      </p:sp>
-    </p:spTree>
-    <p:extLst>
-      <p:ext uri="{BB962C8B-B14F-4D97-AF65-F5344CB8AC3E}">
-        <p14:creationId xmlns:p14="http://schemas.microsoft.com/office/powerpoint/2010/main" val="4049760494"/>
-      </p:ext>
-    </p:extLst>
-  </p:cSld>
-  <p:clrMapOvr>
-    <a:masterClrMapping/>
-  </p:clrMapOvr>
-</p:sld>
-</file>
-
-<file path=ppt/slides/slide7.xml><?xml version="1.0" encoding="utf-8"?>
-<p:sld xmlns:a="http://schemas.openxmlformats.org/drawingml/2006/main" xmlns:r="http://schemas.openxmlformats.org/officeDocument/2006/relationships" xmlns:p="http://schemas.openxmlformats.org/presentationml/2006/main">
-  <p:cSld>
-    <p:spTree>
-      <p:nvGrpSpPr>
-        <p:cNvPr id="1" name=""/>
-        <p:cNvGrpSpPr/>
-        <p:nvPr/>
-      </p:nvGrpSpPr>
-      <p:grpSpPr>
-        <a:xfrm>
-          <a:off x="0" y="0"/>
-          <a:ext cx="0" cy="0"/>
-          <a:chOff x="0" y="0"/>
-          <a:chExt cx="0" cy="0"/>
-        </a:xfrm>
-      </p:grpSpPr>
-      <p:sp>
-        <p:nvSpPr>
-          <p:cNvPr id="4" name="Tekstin paikkamerkki 3"/>
-          <p:cNvSpPr>
-            <a:spLocks noGrp="1"/>
-          </p:cNvSpPr>
-          <p:nvPr>
-            <p:ph idx="1"/>
-          </p:nvPr>
-        </p:nvSpPr>
-        <p:spPr/>
-        <p:txBody>
-          <a:bodyPr/>
-          <a:lstStyle/>
-          <a:p>
-            <a:r>
-              <a:rPr lang="fi-FI" dirty="0"/>
-              <a:t>Liitetiedostot tallentuvat väliaikaisesti liityntäpalvelimen levylle</a:t>
-            </a:r>
-          </a:p>
-          <a:p>
-            <a:r>
-              <a:rPr lang="fi-FI" dirty="0"/>
-              <a:t>Levytila asettaa maksimin käsiteltävien liitteiden koolle</a:t>
-            </a:r>
-          </a:p>
-          <a:p>
-            <a:endParaRPr lang="fi-FI" dirty="0"/>
-          </a:p>
-          <a:p>
-            <a:endParaRPr lang="fi-FI" dirty="0"/>
-          </a:p>
-          <a:p>
-            <a:endParaRPr lang="fi-FI" dirty="0"/>
-          </a:p>
-        </p:txBody>
-      </p:sp>
-      <p:sp>
-        <p:nvSpPr>
-          <p:cNvPr id="3" name="Otsikko 2"/>
-          <p:cNvSpPr>
-            <a:spLocks noGrp="1"/>
-          </p:cNvSpPr>
-          <p:nvPr>
-            <p:ph type="title"/>
-          </p:nvPr>
-        </p:nvSpPr>
-        <p:spPr/>
-        <p:txBody>
-          <a:bodyPr/>
-          <a:lstStyle/>
-          <a:p>
-            <a:r>
-              <a:rPr lang="fi-FI" dirty="0"/>
-              <a:t>Levytila</a:t>
-            </a:r>
-          </a:p>
-        </p:txBody>
-      </p:sp>
-      <p:pic>
-        <p:nvPicPr>
-          <p:cNvPr id="2" name="Picture 1"/>
-          <p:cNvPicPr>
-            <a:picLocks noChangeAspect="1"/>
-          </p:cNvPicPr>
-          <p:nvPr/>
-        </p:nvPicPr>
-        <p:blipFill>
-          <a:blip r:embed="rId2"/>
-          <a:stretch>
-            <a:fillRect/>
-          </a:stretch>
-        </p:blipFill>
-        <p:spPr>
-          <a:xfrm>
-            <a:off x="3088519" y="3093037"/>
-            <a:ext cx="6014961" cy="3619987"/>
-          </a:xfrm>
-          <a:prstGeom prst="rect">
-            <a:avLst/>
-          </a:prstGeom>
-        </p:spPr>
-      </p:pic>
-    </p:spTree>
-    <p:extLst>
-      <p:ext uri="{BB962C8B-B14F-4D97-AF65-F5344CB8AC3E}">
-        <p14:creationId xmlns:p14="http://schemas.microsoft.com/office/powerpoint/2010/main" val="3799199240"/>
-      </p:ext>
-    </p:extLst>
-  </p:cSld>
-  <p:clrMapOvr>
-    <a:masterClrMapping/>
-  </p:clrMapOvr>
-</p:sld>
-</file>
-
-<file path=ppt/slides/slide8.xml><?xml version="1.0" encoding="utf-8"?>
+<file path=ppt/slides/slide10.xml><?xml version="1.0" encoding="utf-8"?>
 <p:sld xmlns:a="http://schemas.openxmlformats.org/drawingml/2006/main" xmlns:r="http://schemas.openxmlformats.org/officeDocument/2006/relationships" xmlns:p="http://schemas.openxmlformats.org/presentationml/2006/main">
   <p:cSld>
     <p:spTree>
@@ -16772,7 +15819,7 @@
 </p:sld>
 </file>
 
-<file path=ppt/slides/slide9.xml><?xml version="1.0" encoding="utf-8"?>
+<file path=ppt/slides/slide11.xml><?xml version="1.0" encoding="utf-8"?>
 <p:sld xmlns:a="http://schemas.openxmlformats.org/drawingml/2006/main" xmlns:r="http://schemas.openxmlformats.org/officeDocument/2006/relationships" xmlns:p="http://schemas.openxmlformats.org/presentationml/2006/main">
   <p:cSld>
     <p:spTree>
@@ -16975,6 +16022,1948 @@
     <p:extLst>
       <p:ext uri="{BB962C8B-B14F-4D97-AF65-F5344CB8AC3E}">
         <p14:creationId xmlns:p14="http://schemas.microsoft.com/office/powerpoint/2010/main" val="561302326"/>
+      </p:ext>
+    </p:extLst>
+  </p:cSld>
+  <p:clrMapOvr>
+    <a:masterClrMapping/>
+  </p:clrMapOvr>
+</p:sld>
+</file>
+
+<file path=ppt/slides/slide12.xml><?xml version="1.0" encoding="utf-8"?>
+<p:sld xmlns:a="http://schemas.openxmlformats.org/drawingml/2006/main" xmlns:r="http://schemas.openxmlformats.org/officeDocument/2006/relationships" xmlns:p="http://schemas.openxmlformats.org/presentationml/2006/main">
+  <p:cSld>
+    <p:spTree>
+      <p:nvGrpSpPr>
+        <p:cNvPr id="1" name=""/>
+        <p:cNvGrpSpPr/>
+        <p:nvPr/>
+      </p:nvGrpSpPr>
+      <p:grpSpPr>
+        <a:xfrm>
+          <a:off x="0" y="0"/>
+          <a:ext cx="0" cy="0"/>
+          <a:chOff x="0" y="0"/>
+          <a:chExt cx="0" cy="0"/>
+        </a:xfrm>
+      </p:grpSpPr>
+      <p:sp>
+        <p:nvSpPr>
+          <p:cNvPr id="3" name="Otsikko 2"/>
+          <p:cNvSpPr>
+            <a:spLocks noGrp="1"/>
+          </p:cNvSpPr>
+          <p:nvPr>
+            <p:ph type="title"/>
+          </p:nvPr>
+        </p:nvSpPr>
+        <p:spPr/>
+        <p:txBody>
+          <a:bodyPr/>
+          <a:lstStyle/>
+          <a:p>
+            <a:r>
+              <a:rPr lang="fi-FI" dirty="0"/>
+              <a:t>Lokitiedostot</a:t>
+            </a:r>
+          </a:p>
+        </p:txBody>
+      </p:sp>
+      <p:graphicFrame>
+        <p:nvGraphicFramePr>
+          <p:cNvPr id="4" name="Taulukko 3"/>
+          <p:cNvGraphicFramePr>
+            <a:graphicFrameLocks noGrp="1"/>
+          </p:cNvGraphicFramePr>
+          <p:nvPr>
+            <p:extLst>
+              <p:ext uri="{D42A27DB-BD31-4B8C-83A1-F6EECF244321}">
+                <p14:modId xmlns:p14="http://schemas.microsoft.com/office/powerpoint/2010/main" val="4045502935"/>
+              </p:ext>
+            </p:extLst>
+          </p:nvPr>
+        </p:nvGraphicFramePr>
+        <p:xfrm>
+          <a:off x="1638513" y="1706879"/>
+          <a:ext cx="8914973" cy="4624249"/>
+        </p:xfrm>
+        <a:graphic>
+          <a:graphicData uri="http://schemas.openxmlformats.org/drawingml/2006/table">
+            <a:tbl>
+              <a:tblPr firstRow="1" bandRow="1">
+                <a:tableStyleId>{D27102A9-8310-4765-A935-A1911B00CA55}</a:tableStyleId>
+              </a:tblPr>
+              <a:tblGrid>
+                <a:gridCol w="1963566">
+                  <a:extLst>
+                    <a:ext uri="{9D8B030D-6E8A-4147-A177-3AD203B41FA5}">
+                      <a16:colId xmlns:a16="http://schemas.microsoft.com/office/drawing/2014/main" val="20000"/>
+                    </a:ext>
+                  </a:extLst>
+                </a:gridCol>
+                <a:gridCol w="3243249">
+                  <a:extLst>
+                    <a:ext uri="{9D8B030D-6E8A-4147-A177-3AD203B41FA5}">
+                      <a16:colId xmlns:a16="http://schemas.microsoft.com/office/drawing/2014/main" val="20001"/>
+                    </a:ext>
+                  </a:extLst>
+                </a:gridCol>
+                <a:gridCol w="3708158">
+                  <a:extLst>
+                    <a:ext uri="{9D8B030D-6E8A-4147-A177-3AD203B41FA5}">
+                      <a16:colId xmlns:a16="http://schemas.microsoft.com/office/drawing/2014/main" val="20002"/>
+                    </a:ext>
+                  </a:extLst>
+                </a:gridCol>
+              </a:tblGrid>
+              <a:tr h="581789">
+                <a:tc>
+                  <a:txBody>
+                    <a:bodyPr/>
+                    <a:lstStyle/>
+                    <a:p>
+                      <a:r>
+                        <a:rPr lang="fi-FI" dirty="0"/>
+                        <a:t>Lokitiedosto</a:t>
+                      </a:r>
+                    </a:p>
+                  </a:txBody>
+                  <a:tcPr/>
+                </a:tc>
+                <a:tc>
+                  <a:txBody>
+                    <a:bodyPr/>
+                    <a:lstStyle/>
+                    <a:p>
+                      <a:r>
+                        <a:rPr lang="fi-FI" dirty="0"/>
+                        <a:t>Sijainti</a:t>
+                      </a:r>
+                    </a:p>
+                  </a:txBody>
+                  <a:tcPr/>
+                </a:tc>
+                <a:tc>
+                  <a:txBody>
+                    <a:bodyPr/>
+                    <a:lstStyle/>
+                    <a:p>
+                      <a:r>
+                        <a:rPr lang="fi-FI" dirty="0"/>
+                        <a:t>Tarkoitus</a:t>
+                      </a:r>
+                    </a:p>
+                  </a:txBody>
+                  <a:tcPr/>
+                </a:tc>
+                <a:extLst>
+                  <a:ext uri="{0D108BD9-81ED-4DB2-BD59-A6C34878D82A}">
+                    <a16:rowId xmlns:a16="http://schemas.microsoft.com/office/drawing/2014/main" val="10000"/>
+                  </a:ext>
+                </a:extLst>
+              </a:tr>
+              <a:tr h="607638">
+                <a:tc>
+                  <a:txBody>
+                    <a:bodyPr/>
+                    <a:lstStyle/>
+                    <a:p>
+                      <a:r>
+                        <a:rPr lang="fi-FI" sz="1400" dirty="0"/>
+                        <a:t>Message</a:t>
+                      </a:r>
+                    </a:p>
+                  </a:txBody>
+                  <a:tcPr/>
+                </a:tc>
+                <a:tc>
+                  <a:txBody>
+                    <a:bodyPr/>
+                    <a:lstStyle/>
+                    <a:p>
+                      <a:r>
+                        <a:rPr lang="fi-FI" sz="1400" dirty="0" err="1"/>
+                        <a:t>PostgreSql</a:t>
+                      </a:r>
+                      <a:r>
+                        <a:rPr lang="fi-FI" sz="1400"/>
+                        <a:t>-tietokanta</a:t>
+                      </a:r>
+                      <a:endParaRPr lang="fi-FI" sz="1400" dirty="0"/>
+                    </a:p>
+                    <a:p>
+                      <a:r>
+                        <a:rPr lang="fi-FI" sz="1400" dirty="0"/>
+                        <a:t>Arkistoidut</a:t>
+                      </a:r>
+                      <a:r>
+                        <a:rPr lang="fi-FI" sz="1400" baseline="0" dirty="0"/>
+                        <a:t> lokit</a:t>
+                      </a:r>
+                      <a:r>
+                        <a:rPr lang="fi-FI" sz="1400" dirty="0"/>
+                        <a:t> </a:t>
+                      </a:r>
+                      <a:r>
+                        <a:rPr lang="fi-FI" sz="1400" kern="1200" dirty="0">
+                          <a:effectLst/>
+                        </a:rPr>
+                        <a:t>/</a:t>
+                      </a:r>
+                      <a:r>
+                        <a:rPr lang="fi-FI" sz="1400" kern="1200" dirty="0" err="1">
+                          <a:effectLst/>
+                        </a:rPr>
+                        <a:t>var</a:t>
+                      </a:r>
+                      <a:r>
+                        <a:rPr lang="fi-FI" sz="1400" kern="1200" dirty="0">
+                          <a:effectLst/>
+                        </a:rPr>
+                        <a:t>/</a:t>
+                      </a:r>
+                      <a:r>
+                        <a:rPr lang="fi-FI" sz="1400" kern="1200" dirty="0" err="1">
+                          <a:effectLst/>
+                        </a:rPr>
+                        <a:t>lib</a:t>
+                      </a:r>
+                      <a:r>
+                        <a:rPr lang="fi-FI" sz="1400" kern="1200" dirty="0">
+                          <a:effectLst/>
+                        </a:rPr>
+                        <a:t>/</a:t>
+                      </a:r>
+                      <a:r>
+                        <a:rPr lang="fi-FI" sz="1400" kern="1200" dirty="0" err="1">
+                          <a:effectLst/>
+                        </a:rPr>
+                        <a:t>xroad</a:t>
+                      </a:r>
+                      <a:endParaRPr lang="fi-FI" sz="1400" dirty="0"/>
+                    </a:p>
+                  </a:txBody>
+                  <a:tcPr/>
+                </a:tc>
+                <a:tc>
+                  <a:txBody>
+                    <a:bodyPr/>
+                    <a:lstStyle/>
+                    <a:p>
+                      <a:r>
+                        <a:rPr lang="fi-FI" sz="1400" dirty="0"/>
+                        <a:t>Viestien</a:t>
+                      </a:r>
+                      <a:r>
+                        <a:rPr lang="fi-FI" sz="1400" baseline="0" dirty="0"/>
+                        <a:t> </a:t>
+                      </a:r>
+                      <a:r>
+                        <a:rPr lang="fi-FI" sz="1400" baseline="0" dirty="0" err="1"/>
+                        <a:t>lokitus</a:t>
+                      </a:r>
+                      <a:endParaRPr lang="fi-FI" sz="1400" dirty="0"/>
+                    </a:p>
+                  </a:txBody>
+                  <a:tcPr/>
+                </a:tc>
+                <a:extLst>
+                  <a:ext uri="{0D108BD9-81ED-4DB2-BD59-A6C34878D82A}">
+                    <a16:rowId xmlns:a16="http://schemas.microsoft.com/office/drawing/2014/main" val="10001"/>
+                  </a:ext>
+                </a:extLst>
+              </a:tr>
+              <a:tr h="607638">
+                <a:tc>
+                  <a:txBody>
+                    <a:bodyPr/>
+                    <a:lstStyle/>
+                    <a:p>
+                      <a:r>
+                        <a:rPr lang="fi-FI" sz="1400" dirty="0" err="1"/>
+                        <a:t>Configuration</a:t>
+                      </a:r>
+                      <a:r>
+                        <a:rPr lang="fi-FI" sz="1400" dirty="0"/>
+                        <a:t> </a:t>
+                      </a:r>
+                      <a:r>
+                        <a:rPr lang="fi-FI" sz="1400" dirty="0" err="1"/>
+                        <a:t>client</a:t>
+                      </a:r>
+                      <a:endParaRPr lang="fi-FI" sz="1400" dirty="0"/>
+                    </a:p>
+                  </a:txBody>
+                  <a:tcPr/>
+                </a:tc>
+                <a:tc>
+                  <a:txBody>
+                    <a:bodyPr/>
+                    <a:lstStyle/>
+                    <a:p>
+                      <a:r>
+                        <a:rPr lang="fi-FI" sz="1400" kern="1200" dirty="0">
+                          <a:effectLst/>
+                        </a:rPr>
+                        <a:t>/</a:t>
+                      </a:r>
+                      <a:r>
+                        <a:rPr lang="fi-FI" sz="1400" kern="1200" dirty="0" err="1">
+                          <a:effectLst/>
+                        </a:rPr>
+                        <a:t>var</a:t>
+                      </a:r>
+                      <a:r>
+                        <a:rPr lang="fi-FI" sz="1400" kern="1200" dirty="0">
+                          <a:effectLst/>
+                        </a:rPr>
+                        <a:t>/</a:t>
+                      </a:r>
+                      <a:r>
+                        <a:rPr lang="fi-FI" sz="1400" kern="1200" dirty="0" err="1">
+                          <a:effectLst/>
+                        </a:rPr>
+                        <a:t>log</a:t>
+                      </a:r>
+                      <a:r>
+                        <a:rPr lang="fi-FI" sz="1400" kern="1200" dirty="0">
+                          <a:effectLst/>
+                        </a:rPr>
+                        <a:t>/</a:t>
+                      </a:r>
+                      <a:r>
+                        <a:rPr lang="fi-FI" sz="1400" kern="1200" dirty="0" err="1">
+                          <a:effectLst/>
+                        </a:rPr>
+                        <a:t>xroad</a:t>
+                      </a:r>
+                      <a:r>
+                        <a:rPr lang="fi-FI" sz="1400" kern="1200" dirty="0">
+                          <a:effectLst/>
+                        </a:rPr>
+                        <a:t>/configuration_client.log</a:t>
+                      </a:r>
+                      <a:endParaRPr lang="fi-FI" sz="1400" dirty="0"/>
+                    </a:p>
+                  </a:txBody>
+                  <a:tcPr/>
+                </a:tc>
+                <a:tc>
+                  <a:txBody>
+                    <a:bodyPr/>
+                    <a:lstStyle/>
+                    <a:p>
+                      <a:pPr marL="0" marR="0" indent="0" algn="l" defTabSz="749213" rtl="0" eaLnBrk="1" fontAlgn="auto" latinLnBrk="0" hangingPunct="1">
+                        <a:lnSpc>
+                          <a:spcPct val="100000"/>
+                        </a:lnSpc>
+                        <a:spcBef>
+                          <a:spcPts val="0"/>
+                        </a:spcBef>
+                        <a:spcAft>
+                          <a:spcPts val="0"/>
+                        </a:spcAft>
+                        <a:buClrTx/>
+                        <a:buSzTx/>
+                        <a:buFontTx/>
+                        <a:buNone/>
+                        <a:tabLst/>
+                        <a:defRPr/>
+                      </a:pPr>
+                      <a:r>
+                        <a:rPr lang="fi-FI" sz="1400" dirty="0"/>
+                        <a:t>Keskuskonfiguraation hakeminen</a:t>
+                      </a:r>
+                    </a:p>
+                  </a:txBody>
+                  <a:tcPr/>
+                </a:tc>
+                <a:extLst>
+                  <a:ext uri="{0D108BD9-81ED-4DB2-BD59-A6C34878D82A}">
+                    <a16:rowId xmlns:a16="http://schemas.microsoft.com/office/drawing/2014/main" val="10002"/>
+                  </a:ext>
+                </a:extLst>
+              </a:tr>
+              <a:tr h="607638">
+                <a:tc>
+                  <a:txBody>
+                    <a:bodyPr/>
+                    <a:lstStyle/>
+                    <a:p>
+                      <a:r>
+                        <a:rPr lang="fi-FI" sz="1400" dirty="0"/>
+                        <a:t>Proxy</a:t>
+                      </a:r>
+                    </a:p>
+                  </a:txBody>
+                  <a:tcPr/>
+                </a:tc>
+                <a:tc>
+                  <a:txBody>
+                    <a:bodyPr/>
+                    <a:lstStyle/>
+                    <a:p>
+                      <a:r>
+                        <a:rPr lang="fi-FI" sz="1400" kern="1200" dirty="0">
+                          <a:effectLst/>
+                        </a:rPr>
+                        <a:t>/</a:t>
+                      </a:r>
+                      <a:r>
+                        <a:rPr lang="fi-FI" sz="1400" kern="1200" dirty="0" err="1">
+                          <a:effectLst/>
+                        </a:rPr>
+                        <a:t>var</a:t>
+                      </a:r>
+                      <a:r>
+                        <a:rPr lang="fi-FI" sz="1400" kern="1200" dirty="0">
+                          <a:effectLst/>
+                        </a:rPr>
+                        <a:t>/</a:t>
+                      </a:r>
+                      <a:r>
+                        <a:rPr lang="fi-FI" sz="1400" kern="1200" dirty="0" err="1">
+                          <a:effectLst/>
+                        </a:rPr>
+                        <a:t>log</a:t>
+                      </a:r>
+                      <a:r>
+                        <a:rPr lang="fi-FI" sz="1400" kern="1200" dirty="0">
+                          <a:effectLst/>
+                        </a:rPr>
+                        <a:t>/</a:t>
+                      </a:r>
+                      <a:r>
+                        <a:rPr lang="fi-FI" sz="1400" kern="1200" dirty="0" err="1">
+                          <a:effectLst/>
+                        </a:rPr>
+                        <a:t>xroad</a:t>
+                      </a:r>
+                      <a:r>
+                        <a:rPr lang="fi-FI" sz="1400" kern="1200" dirty="0">
+                          <a:effectLst/>
+                        </a:rPr>
+                        <a:t>/proxy.log</a:t>
+                      </a:r>
+                      <a:endParaRPr lang="fi-FI" sz="1400" dirty="0"/>
+                    </a:p>
+                  </a:txBody>
+                  <a:tcPr/>
+                </a:tc>
+                <a:tc>
+                  <a:txBody>
+                    <a:bodyPr/>
+                    <a:lstStyle/>
+                    <a:p>
+                      <a:r>
+                        <a:rPr lang="fi-FI" sz="1400" dirty="0"/>
+                        <a:t>Viestinvälityksen</a:t>
+                      </a:r>
+                      <a:r>
+                        <a:rPr lang="fi-FI" sz="1400" baseline="0" dirty="0"/>
+                        <a:t> tekninen häiriöloki</a:t>
+                      </a:r>
+                      <a:endParaRPr lang="fi-FI" sz="1400" dirty="0"/>
+                    </a:p>
+                  </a:txBody>
+                  <a:tcPr/>
+                </a:tc>
+                <a:extLst>
+                  <a:ext uri="{0D108BD9-81ED-4DB2-BD59-A6C34878D82A}">
+                    <a16:rowId xmlns:a16="http://schemas.microsoft.com/office/drawing/2014/main" val="10003"/>
+                  </a:ext>
+                </a:extLst>
+              </a:tr>
+              <a:tr h="607638">
+                <a:tc>
+                  <a:txBody>
+                    <a:bodyPr/>
+                    <a:lstStyle/>
+                    <a:p>
+                      <a:r>
+                        <a:rPr lang="fi-FI" sz="1400" dirty="0"/>
+                        <a:t>System </a:t>
+                      </a:r>
+                      <a:r>
+                        <a:rPr lang="fi-FI" sz="1400" dirty="0" err="1"/>
+                        <a:t>monitor</a:t>
+                      </a:r>
+                      <a:endParaRPr lang="fi-FI" sz="1400" dirty="0"/>
+                    </a:p>
+                  </a:txBody>
+                  <a:tcPr/>
+                </a:tc>
+                <a:tc>
+                  <a:txBody>
+                    <a:bodyPr/>
+                    <a:lstStyle/>
+                    <a:p>
+                      <a:r>
+                        <a:rPr lang="fi-FI" sz="1400" kern="1200" dirty="0">
+                          <a:effectLst/>
+                        </a:rPr>
+                        <a:t>/</a:t>
+                      </a:r>
+                      <a:r>
+                        <a:rPr lang="fi-FI" sz="1400" kern="1200" dirty="0" err="1">
+                          <a:effectLst/>
+                        </a:rPr>
+                        <a:t>var</a:t>
+                      </a:r>
+                      <a:r>
+                        <a:rPr lang="fi-FI" sz="1400" kern="1200" dirty="0">
+                          <a:effectLst/>
+                        </a:rPr>
+                        <a:t>/</a:t>
+                      </a:r>
+                      <a:r>
+                        <a:rPr lang="fi-FI" sz="1400" kern="1200" dirty="0" err="1">
+                          <a:effectLst/>
+                        </a:rPr>
+                        <a:t>log</a:t>
+                      </a:r>
+                      <a:r>
+                        <a:rPr lang="fi-FI" sz="1400" kern="1200" dirty="0">
+                          <a:effectLst/>
+                        </a:rPr>
+                        <a:t>/</a:t>
+                      </a:r>
+                      <a:r>
+                        <a:rPr lang="fi-FI" sz="1400" kern="1200" dirty="0" err="1">
+                          <a:effectLst/>
+                        </a:rPr>
+                        <a:t>xroad</a:t>
+                      </a:r>
+                      <a:r>
+                        <a:rPr lang="fi-FI" sz="1400" kern="1200" dirty="0">
+                          <a:effectLst/>
+                        </a:rPr>
+                        <a:t>/system-monitor.log</a:t>
+                      </a:r>
+                      <a:endParaRPr lang="fi-FI" sz="1400" dirty="0"/>
+                    </a:p>
+                  </a:txBody>
+                  <a:tcPr/>
+                </a:tc>
+                <a:tc>
+                  <a:txBody>
+                    <a:bodyPr/>
+                    <a:lstStyle/>
+                    <a:p>
+                      <a:r>
+                        <a:rPr lang="fi-FI" sz="1400" dirty="0" err="1"/>
+                        <a:t>Lokittaa</a:t>
+                      </a:r>
+                      <a:r>
+                        <a:rPr lang="fi-FI" sz="1400" baseline="0" dirty="0"/>
+                        <a:t> j</a:t>
+                      </a:r>
+                      <a:r>
+                        <a:rPr lang="fi-FI" sz="1400" dirty="0"/>
+                        <a:t>ärjestelmän käytössä olevia</a:t>
+                      </a:r>
+                      <a:r>
+                        <a:rPr lang="fi-FI" sz="1400" baseline="0" dirty="0"/>
+                        <a:t> resursseja</a:t>
+                      </a:r>
+                      <a:endParaRPr lang="fi-FI" sz="1400" dirty="0"/>
+                    </a:p>
+                  </a:txBody>
+                  <a:tcPr/>
+                </a:tc>
+                <a:extLst>
+                  <a:ext uri="{0D108BD9-81ED-4DB2-BD59-A6C34878D82A}">
+                    <a16:rowId xmlns:a16="http://schemas.microsoft.com/office/drawing/2014/main" val="10004"/>
+                  </a:ext>
+                </a:extLst>
+              </a:tr>
+              <a:tr h="805954">
+                <a:tc>
+                  <a:txBody>
+                    <a:bodyPr/>
+                    <a:lstStyle/>
+                    <a:p>
+                      <a:r>
+                        <a:rPr lang="fi-FI" sz="1400" dirty="0" err="1"/>
+                        <a:t>Clientproxy</a:t>
+                      </a:r>
+                      <a:r>
+                        <a:rPr lang="fi-FI" sz="1400" dirty="0"/>
+                        <a:t> </a:t>
+                      </a:r>
+                      <a:r>
+                        <a:rPr lang="fi-FI" sz="1400" dirty="0" err="1"/>
+                        <a:t>access</a:t>
+                      </a:r>
+                      <a:endParaRPr lang="fi-FI" sz="1400" dirty="0"/>
+                    </a:p>
+                  </a:txBody>
+                  <a:tcPr/>
+                </a:tc>
+                <a:tc>
+                  <a:txBody>
+                    <a:bodyPr/>
+                    <a:lstStyle/>
+                    <a:p>
+                      <a:r>
+                        <a:rPr lang="fi-FI" sz="1400" kern="1200" dirty="0">
+                          <a:effectLst/>
+                        </a:rPr>
+                        <a:t>/</a:t>
+                      </a:r>
+                      <a:r>
+                        <a:rPr lang="fi-FI" sz="1400" kern="1200" dirty="0" err="1">
+                          <a:effectLst/>
+                        </a:rPr>
+                        <a:t>var</a:t>
+                      </a:r>
+                      <a:r>
+                        <a:rPr lang="fi-FI" sz="1400" kern="1200" dirty="0">
+                          <a:effectLst/>
+                        </a:rPr>
+                        <a:t>/</a:t>
+                      </a:r>
+                      <a:r>
+                        <a:rPr lang="fi-FI" sz="1400" kern="1200" dirty="0" err="1">
+                          <a:effectLst/>
+                        </a:rPr>
+                        <a:t>log</a:t>
+                      </a:r>
+                      <a:r>
+                        <a:rPr lang="fi-FI" sz="1400" kern="1200" dirty="0">
+                          <a:effectLst/>
+                        </a:rPr>
+                        <a:t>/</a:t>
+                      </a:r>
+                      <a:r>
+                        <a:rPr lang="fi-FI" sz="1400" kern="1200" dirty="0" err="1">
+                          <a:effectLst/>
+                        </a:rPr>
+                        <a:t>xroad</a:t>
+                      </a:r>
+                      <a:r>
+                        <a:rPr lang="fi-FI" sz="1400" kern="1200" dirty="0">
+                          <a:effectLst/>
+                        </a:rPr>
+                        <a:t>/clientproxy_access.log</a:t>
+                      </a:r>
+                      <a:endParaRPr lang="fi-FI" sz="1400" dirty="0"/>
+                    </a:p>
+                  </a:txBody>
+                  <a:tcPr/>
+                </a:tc>
+                <a:tc>
+                  <a:txBody>
+                    <a:bodyPr/>
+                    <a:lstStyle/>
+                    <a:p>
+                      <a:r>
+                        <a:rPr lang="fi-FI" sz="1400" dirty="0" err="1"/>
+                        <a:t>Lokittaa</a:t>
+                      </a:r>
+                      <a:r>
+                        <a:rPr lang="fi-FI" sz="1400" dirty="0"/>
+                        <a:t> yhteyden muodostukset ulkopuolelta tähän liityntäpalvelimeen</a:t>
+                      </a:r>
+                    </a:p>
+                  </a:txBody>
+                  <a:tcPr/>
+                </a:tc>
+                <a:extLst>
+                  <a:ext uri="{0D108BD9-81ED-4DB2-BD59-A6C34878D82A}">
+                    <a16:rowId xmlns:a16="http://schemas.microsoft.com/office/drawing/2014/main" val="10005"/>
+                  </a:ext>
+                </a:extLst>
+              </a:tr>
+              <a:tr h="805954">
+                <a:tc>
+                  <a:txBody>
+                    <a:bodyPr/>
+                    <a:lstStyle/>
+                    <a:p>
+                      <a:r>
+                        <a:rPr lang="fi-FI" sz="1400" dirty="0" err="1"/>
+                        <a:t>Serverproxy</a:t>
+                      </a:r>
+                      <a:r>
+                        <a:rPr lang="fi-FI" sz="1400" dirty="0"/>
+                        <a:t> </a:t>
+                      </a:r>
+                      <a:r>
+                        <a:rPr lang="fi-FI" sz="1400" dirty="0" err="1"/>
+                        <a:t>access</a:t>
+                      </a:r>
+                      <a:endParaRPr lang="fi-FI" sz="1400" dirty="0"/>
+                    </a:p>
+                  </a:txBody>
+                  <a:tcPr/>
+                </a:tc>
+                <a:tc>
+                  <a:txBody>
+                    <a:bodyPr/>
+                    <a:lstStyle/>
+                    <a:p>
+                      <a:r>
+                        <a:rPr lang="fi-FI" sz="1400" kern="1200" dirty="0">
+                          <a:effectLst/>
+                        </a:rPr>
+                        <a:t>/</a:t>
+                      </a:r>
+                      <a:r>
+                        <a:rPr lang="fi-FI" sz="1400" kern="1200" dirty="0" err="1">
+                          <a:effectLst/>
+                        </a:rPr>
+                        <a:t>var</a:t>
+                      </a:r>
+                      <a:r>
+                        <a:rPr lang="fi-FI" sz="1400" kern="1200" dirty="0">
+                          <a:effectLst/>
+                        </a:rPr>
+                        <a:t>/</a:t>
+                      </a:r>
+                      <a:r>
+                        <a:rPr lang="fi-FI" sz="1400" kern="1200" dirty="0" err="1">
+                          <a:effectLst/>
+                        </a:rPr>
+                        <a:t>log</a:t>
+                      </a:r>
+                      <a:r>
+                        <a:rPr lang="fi-FI" sz="1400" kern="1200" dirty="0">
+                          <a:effectLst/>
+                        </a:rPr>
+                        <a:t>/</a:t>
+                      </a:r>
+                      <a:r>
+                        <a:rPr lang="fi-FI" sz="1400" kern="1200" dirty="0" err="1">
+                          <a:effectLst/>
+                        </a:rPr>
+                        <a:t>xroad</a:t>
+                      </a:r>
+                      <a:r>
+                        <a:rPr lang="fi-FI" sz="1400" kern="1200" dirty="0">
+                          <a:effectLst/>
+                        </a:rPr>
+                        <a:t>/serverproxy_access.log</a:t>
+                      </a:r>
+                      <a:endParaRPr lang="fi-FI" sz="1400" dirty="0"/>
+                    </a:p>
+                  </a:txBody>
+                  <a:tcPr/>
+                </a:tc>
+                <a:tc>
+                  <a:txBody>
+                    <a:bodyPr/>
+                    <a:lstStyle/>
+                    <a:p>
+                      <a:r>
+                        <a:rPr lang="fi-FI" sz="1400" dirty="0" err="1"/>
+                        <a:t>Lokittaa</a:t>
+                      </a:r>
+                      <a:r>
+                        <a:rPr lang="fi-FI" sz="1400" dirty="0"/>
+                        <a:t> muiden liityntäpalvelinten yhteyden muodostukset tähän liityntäpalvelimeen</a:t>
+                      </a:r>
+                    </a:p>
+                  </a:txBody>
+                  <a:tcPr/>
+                </a:tc>
+                <a:extLst>
+                  <a:ext uri="{0D108BD9-81ED-4DB2-BD59-A6C34878D82A}">
+                    <a16:rowId xmlns:a16="http://schemas.microsoft.com/office/drawing/2014/main" val="10006"/>
+                  </a:ext>
+                </a:extLst>
+              </a:tr>
+            </a:tbl>
+          </a:graphicData>
+        </a:graphic>
+      </p:graphicFrame>
+    </p:spTree>
+    <p:extLst>
+      <p:ext uri="{BB962C8B-B14F-4D97-AF65-F5344CB8AC3E}">
+        <p14:creationId xmlns:p14="http://schemas.microsoft.com/office/powerpoint/2010/main" val="3236190807"/>
+      </p:ext>
+    </p:extLst>
+  </p:cSld>
+  <p:clrMapOvr>
+    <a:masterClrMapping/>
+  </p:clrMapOvr>
+</p:sld>
+</file>
+
+<file path=ppt/slides/slide2.xml><?xml version="1.0" encoding="utf-8"?>
+<p:sld xmlns:a="http://schemas.openxmlformats.org/drawingml/2006/main" xmlns:r="http://schemas.openxmlformats.org/officeDocument/2006/relationships" xmlns:p="http://schemas.openxmlformats.org/presentationml/2006/main">
+  <p:cSld>
+    <p:spTree>
+      <p:nvGrpSpPr>
+        <p:cNvPr id="1" name=""/>
+        <p:cNvGrpSpPr/>
+        <p:nvPr/>
+      </p:nvGrpSpPr>
+      <p:grpSpPr>
+        <a:xfrm>
+          <a:off x="0" y="0"/>
+          <a:ext cx="0" cy="0"/>
+          <a:chOff x="0" y="0"/>
+          <a:chExt cx="0" cy="0"/>
+        </a:xfrm>
+      </p:grpSpPr>
+      <p:sp>
+        <p:nvSpPr>
+          <p:cNvPr id="3" name="Otsikko 2"/>
+          <p:cNvSpPr>
+            <a:spLocks noGrp="1"/>
+          </p:cNvSpPr>
+          <p:nvPr>
+            <p:ph type="title"/>
+          </p:nvPr>
+        </p:nvSpPr>
+        <p:spPr/>
+        <p:txBody>
+          <a:bodyPr/>
+          <a:lstStyle/>
+          <a:p>
+            <a:r>
+              <a:rPr lang="fi-FI" dirty="0" err="1"/>
+              <a:t>Backup</a:t>
+            </a:r>
+            <a:r>
+              <a:rPr lang="fi-FI" dirty="0"/>
+              <a:t> / </a:t>
+            </a:r>
+            <a:r>
+              <a:rPr lang="fi-FI" dirty="0" err="1"/>
+              <a:t>restore</a:t>
+            </a:r>
+            <a:endParaRPr lang="fi-FI" dirty="0"/>
+          </a:p>
+        </p:txBody>
+      </p:sp>
+      <p:sp>
+        <p:nvSpPr>
+          <p:cNvPr id="2" name="Sisällön paikkamerkki 1"/>
+          <p:cNvSpPr>
+            <a:spLocks noGrp="1"/>
+          </p:cNvSpPr>
+          <p:nvPr>
+            <p:ph idx="13"/>
+          </p:nvPr>
+        </p:nvSpPr>
+        <p:spPr>
+          <a:xfrm>
+            <a:off x="907649" y="2772609"/>
+            <a:ext cx="5018590" cy="2714539"/>
+          </a:xfrm>
+        </p:spPr>
+        <p:txBody>
+          <a:bodyPr/>
+          <a:lstStyle/>
+          <a:p>
+            <a:r>
+              <a:rPr lang="fi-FI" dirty="0"/>
+              <a:t>Tallentaa liityntäpalvelimen konfiguraation, myös avaimet ja varmenteet</a:t>
+            </a:r>
+          </a:p>
+          <a:p>
+            <a:endParaRPr lang="fi-FI" dirty="0"/>
+          </a:p>
+        </p:txBody>
+      </p:sp>
+      <p:pic>
+        <p:nvPicPr>
+          <p:cNvPr id="6" name="Picture 4"/>
+          <p:cNvPicPr>
+            <a:picLocks noGrp="1" noChangeAspect="1"/>
+          </p:cNvPicPr>
+          <p:nvPr>
+            <p:ph idx="14"/>
+          </p:nvPr>
+        </p:nvPicPr>
+        <p:blipFill>
+          <a:blip r:embed="rId2"/>
+          <a:stretch>
+            <a:fillRect/>
+          </a:stretch>
+        </p:blipFill>
+        <p:spPr>
+          <a:xfrm>
+            <a:off x="5926239" y="2473459"/>
+            <a:ext cx="5770913" cy="3312841"/>
+          </a:xfrm>
+          <a:prstGeom prst="rect">
+            <a:avLst/>
+          </a:prstGeom>
+        </p:spPr>
+      </p:pic>
+    </p:spTree>
+    <p:extLst>
+      <p:ext uri="{BB962C8B-B14F-4D97-AF65-F5344CB8AC3E}">
+        <p14:creationId xmlns:p14="http://schemas.microsoft.com/office/powerpoint/2010/main" val="2463693408"/>
+      </p:ext>
+    </p:extLst>
+  </p:cSld>
+  <p:clrMapOvr>
+    <a:masterClrMapping/>
+  </p:clrMapOvr>
+</p:sld>
+</file>
+
+<file path=ppt/slides/slide3.xml><?xml version="1.0" encoding="utf-8"?>
+<p:sld xmlns:a="http://schemas.openxmlformats.org/drawingml/2006/main" xmlns:r="http://schemas.openxmlformats.org/officeDocument/2006/relationships" xmlns:p="http://schemas.openxmlformats.org/presentationml/2006/main">
+  <p:cSld>
+    <p:spTree>
+      <p:nvGrpSpPr>
+        <p:cNvPr id="1" name=""/>
+        <p:cNvGrpSpPr/>
+        <p:nvPr/>
+      </p:nvGrpSpPr>
+      <p:grpSpPr>
+        <a:xfrm>
+          <a:off x="0" y="0"/>
+          <a:ext cx="0" cy="0"/>
+          <a:chOff x="0" y="0"/>
+          <a:chExt cx="0" cy="0"/>
+        </a:xfrm>
+      </p:grpSpPr>
+      <p:sp>
+        <p:nvSpPr>
+          <p:cNvPr id="2" name="Sisällön paikkamerkki 1"/>
+          <p:cNvSpPr>
+            <a:spLocks noGrp="1"/>
+          </p:cNvSpPr>
+          <p:nvPr>
+            <p:ph idx="1"/>
+          </p:nvPr>
+        </p:nvSpPr>
+        <p:spPr>
+          <a:xfrm>
+            <a:off x="838200" y="2027124"/>
+            <a:ext cx="5096948" cy="4526615"/>
+          </a:xfrm>
+        </p:spPr>
+        <p:txBody>
+          <a:bodyPr/>
+          <a:lstStyle/>
+          <a:p>
+            <a:r>
+              <a:rPr lang="fi-FI" dirty="0"/>
+              <a:t>Kertoo toimiiko </a:t>
+            </a:r>
+            <a:r>
+              <a:rPr lang="fi-FI" b="1" dirty="0" err="1"/>
+              <a:t>global</a:t>
+            </a:r>
+            <a:r>
+              <a:rPr lang="fi-FI" b="1" dirty="0"/>
+              <a:t> </a:t>
+            </a:r>
+            <a:r>
+              <a:rPr lang="fi-FI" b="1" dirty="0" err="1"/>
+              <a:t>configuraation</a:t>
+            </a:r>
+            <a:r>
+              <a:rPr lang="fi-FI" b="1" dirty="0"/>
+              <a:t> haku </a:t>
+            </a:r>
+            <a:r>
+              <a:rPr lang="fi-FI" dirty="0"/>
+              <a:t>ja </a:t>
+            </a:r>
+            <a:r>
+              <a:rPr lang="fi-FI" b="1" dirty="0"/>
+              <a:t>yhteys aikaleimapalvelimelle</a:t>
+            </a:r>
+          </a:p>
+          <a:p>
+            <a:r>
+              <a:rPr lang="fi-FI" dirty="0"/>
+              <a:t>Myös lisää ominaisuuksia liityntäpalvelimen valvontaan (mm. SOAP palvelun avulla) ollaan julkaisemassa lähiaikoina</a:t>
+            </a:r>
+          </a:p>
+          <a:p>
+            <a:endParaRPr lang="fi-FI" dirty="0"/>
+          </a:p>
+        </p:txBody>
+      </p:sp>
+      <p:sp>
+        <p:nvSpPr>
+          <p:cNvPr id="3" name="Otsikko 2"/>
+          <p:cNvSpPr>
+            <a:spLocks noGrp="1"/>
+          </p:cNvSpPr>
+          <p:nvPr>
+            <p:ph type="title"/>
+          </p:nvPr>
+        </p:nvSpPr>
+        <p:spPr/>
+        <p:txBody>
+          <a:bodyPr/>
+          <a:lstStyle/>
+          <a:p>
+            <a:r>
+              <a:rPr lang="fi-FI" dirty="0"/>
+              <a:t>Diagnostiikka</a:t>
+            </a:r>
+          </a:p>
+        </p:txBody>
+      </p:sp>
+      <p:pic>
+        <p:nvPicPr>
+          <p:cNvPr id="4" name="Picture 1"/>
+          <p:cNvPicPr>
+            <a:picLocks noChangeAspect="1"/>
+          </p:cNvPicPr>
+          <p:nvPr/>
+        </p:nvPicPr>
+        <p:blipFill>
+          <a:blip r:embed="rId2"/>
+          <a:stretch>
+            <a:fillRect/>
+          </a:stretch>
+        </p:blipFill>
+        <p:spPr>
+          <a:xfrm>
+            <a:off x="5935148" y="2027124"/>
+            <a:ext cx="5773961" cy="3314592"/>
+          </a:xfrm>
+          <a:prstGeom prst="rect">
+            <a:avLst/>
+          </a:prstGeom>
+        </p:spPr>
+      </p:pic>
+    </p:spTree>
+    <p:extLst>
+      <p:ext uri="{BB962C8B-B14F-4D97-AF65-F5344CB8AC3E}">
+        <p14:creationId xmlns:p14="http://schemas.microsoft.com/office/powerpoint/2010/main" val="3503981542"/>
+      </p:ext>
+    </p:extLst>
+  </p:cSld>
+  <p:clrMapOvr>
+    <a:masterClrMapping/>
+  </p:clrMapOvr>
+</p:sld>
+</file>
+
+<file path=ppt/slides/slide4.xml><?xml version="1.0" encoding="utf-8"?>
+<p:sld xmlns:a="http://schemas.openxmlformats.org/drawingml/2006/main" xmlns:r="http://schemas.openxmlformats.org/officeDocument/2006/relationships" xmlns:p="http://schemas.openxmlformats.org/presentationml/2006/main">
+  <p:cSld>
+    <p:spTree>
+      <p:nvGrpSpPr>
+        <p:cNvPr id="1" name=""/>
+        <p:cNvGrpSpPr/>
+        <p:nvPr/>
+      </p:nvGrpSpPr>
+      <p:grpSpPr>
+        <a:xfrm>
+          <a:off x="0" y="0"/>
+          <a:ext cx="0" cy="0"/>
+          <a:chOff x="0" y="0"/>
+          <a:chExt cx="0" cy="0"/>
+        </a:xfrm>
+      </p:grpSpPr>
+      <p:sp>
+        <p:nvSpPr>
+          <p:cNvPr id="5" name="Otsikko 4"/>
+          <p:cNvSpPr>
+            <a:spLocks noGrp="1"/>
+          </p:cNvSpPr>
+          <p:nvPr>
+            <p:ph type="title"/>
+          </p:nvPr>
+        </p:nvSpPr>
+        <p:spPr/>
+        <p:txBody>
+          <a:bodyPr/>
+          <a:lstStyle/>
+          <a:p>
+            <a:r>
+              <a:rPr lang="fi-FI" dirty="0"/>
+              <a:t>Liityntäpalvelimen prosessit</a:t>
+            </a:r>
+          </a:p>
+        </p:txBody>
+      </p:sp>
+      <p:pic>
+        <p:nvPicPr>
+          <p:cNvPr id="7" name="Sisällön paikkamerkki 6"/>
+          <p:cNvPicPr>
+            <a:picLocks noGrp="1" noChangeAspect="1"/>
+          </p:cNvPicPr>
+          <p:nvPr>
+            <p:ph idx="1"/>
+          </p:nvPr>
+        </p:nvPicPr>
+        <p:blipFill>
+          <a:blip r:embed="rId2">
+            <a:extLst>
+              <a:ext uri="{28A0092B-C50C-407E-A947-70E740481C1C}">
+                <a14:useLocalDpi xmlns:a14="http://schemas.microsoft.com/office/drawing/2010/main" val="0"/>
+              </a:ext>
+            </a:extLst>
+          </a:blip>
+          <a:stretch>
+            <a:fillRect/>
+          </a:stretch>
+        </p:blipFill>
+        <p:spPr>
+          <a:xfrm>
+            <a:off x="2370159" y="1609725"/>
+            <a:ext cx="7451681" cy="5177246"/>
+          </a:xfrm>
+          <a:prstGeom prst="rect">
+            <a:avLst/>
+          </a:prstGeom>
+        </p:spPr>
+      </p:pic>
+    </p:spTree>
+    <p:extLst>
+      <p:ext uri="{BB962C8B-B14F-4D97-AF65-F5344CB8AC3E}">
+        <p14:creationId xmlns:p14="http://schemas.microsoft.com/office/powerpoint/2010/main" val="770099607"/>
+      </p:ext>
+    </p:extLst>
+  </p:cSld>
+  <p:clrMapOvr>
+    <a:masterClrMapping/>
+  </p:clrMapOvr>
+</p:sld>
+</file>
+
+<file path=ppt/slides/slide5.xml><?xml version="1.0" encoding="utf-8"?>
+<p:sld xmlns:a="http://schemas.openxmlformats.org/drawingml/2006/main" xmlns:r="http://schemas.openxmlformats.org/officeDocument/2006/relationships" xmlns:p="http://schemas.openxmlformats.org/presentationml/2006/main">
+  <p:cSld>
+    <p:spTree>
+      <p:nvGrpSpPr>
+        <p:cNvPr id="1" name=""/>
+        <p:cNvGrpSpPr/>
+        <p:nvPr/>
+      </p:nvGrpSpPr>
+      <p:grpSpPr>
+        <a:xfrm>
+          <a:off x="0" y="0"/>
+          <a:ext cx="0" cy="0"/>
+          <a:chOff x="0" y="0"/>
+          <a:chExt cx="0" cy="0"/>
+        </a:xfrm>
+      </p:grpSpPr>
+      <p:sp>
+        <p:nvSpPr>
+          <p:cNvPr id="3" name="Otsikko 2"/>
+          <p:cNvSpPr>
+            <a:spLocks noGrp="1"/>
+          </p:cNvSpPr>
+          <p:nvPr>
+            <p:ph type="title"/>
+          </p:nvPr>
+        </p:nvSpPr>
+        <p:spPr/>
+        <p:txBody>
+          <a:bodyPr/>
+          <a:lstStyle/>
+          <a:p>
+            <a:r>
+              <a:rPr lang="fi-FI" dirty="0"/>
+              <a:t>Liityntäpalvelimen prosessit</a:t>
+            </a:r>
+          </a:p>
+        </p:txBody>
+      </p:sp>
+      <p:graphicFrame>
+        <p:nvGraphicFramePr>
+          <p:cNvPr id="4" name="Taulukko 3"/>
+          <p:cNvGraphicFramePr>
+            <a:graphicFrameLocks noGrp="1"/>
+          </p:cNvGraphicFramePr>
+          <p:nvPr>
+            <p:extLst>
+              <p:ext uri="{D42A27DB-BD31-4B8C-83A1-F6EECF244321}">
+                <p14:modId xmlns:p14="http://schemas.microsoft.com/office/powerpoint/2010/main" val="1747326524"/>
+              </p:ext>
+            </p:extLst>
+          </p:nvPr>
+        </p:nvGraphicFramePr>
+        <p:xfrm>
+          <a:off x="1653110" y="1741714"/>
+          <a:ext cx="8885780" cy="4809368"/>
+        </p:xfrm>
+        <a:graphic>
+          <a:graphicData uri="http://schemas.openxmlformats.org/drawingml/2006/table">
+            <a:tbl>
+              <a:tblPr firstRow="1" bandRow="1">
+                <a:tableStyleId>{D27102A9-8310-4765-A935-A1911B00CA55}</a:tableStyleId>
+              </a:tblPr>
+              <a:tblGrid>
+                <a:gridCol w="4442890">
+                  <a:extLst>
+                    <a:ext uri="{9D8B030D-6E8A-4147-A177-3AD203B41FA5}">
+                      <a16:colId xmlns:a16="http://schemas.microsoft.com/office/drawing/2014/main" val="20000"/>
+                    </a:ext>
+                  </a:extLst>
+                </a:gridCol>
+                <a:gridCol w="4442890">
+                  <a:extLst>
+                    <a:ext uri="{9D8B030D-6E8A-4147-A177-3AD203B41FA5}">
+                      <a16:colId xmlns:a16="http://schemas.microsoft.com/office/drawing/2014/main" val="20001"/>
+                    </a:ext>
+                  </a:extLst>
+                </a:gridCol>
+              </a:tblGrid>
+              <a:tr h="722339">
+                <a:tc>
+                  <a:txBody>
+                    <a:bodyPr/>
+                    <a:lstStyle/>
+                    <a:p>
+                      <a:r>
+                        <a:rPr lang="fi-FI" sz="2400" dirty="0"/>
+                        <a:t>Prosessi</a:t>
+                      </a:r>
+                    </a:p>
+                  </a:txBody>
+                  <a:tcPr/>
+                </a:tc>
+                <a:tc>
+                  <a:txBody>
+                    <a:bodyPr/>
+                    <a:lstStyle/>
+                    <a:p>
+                      <a:r>
+                        <a:rPr lang="fi-FI" sz="2400" dirty="0"/>
+                        <a:t>Vastuut</a:t>
+                      </a:r>
+                    </a:p>
+                  </a:txBody>
+                  <a:tcPr/>
+                </a:tc>
+                <a:extLst>
+                  <a:ext uri="{0D108BD9-81ED-4DB2-BD59-A6C34878D82A}">
+                    <a16:rowId xmlns:a16="http://schemas.microsoft.com/office/drawing/2014/main" val="10000"/>
+                  </a:ext>
+                </a:extLst>
+              </a:tr>
+              <a:tr h="722339">
+                <a:tc>
+                  <a:txBody>
+                    <a:bodyPr/>
+                    <a:lstStyle/>
+                    <a:p>
+                      <a:r>
+                        <a:rPr lang="fi-FI" sz="2400" dirty="0" err="1"/>
+                        <a:t>nginx</a:t>
+                      </a:r>
+                      <a:endParaRPr lang="fi-FI" sz="2400" dirty="0"/>
+                    </a:p>
+                  </a:txBody>
+                  <a:tcPr/>
+                </a:tc>
+                <a:tc>
+                  <a:txBody>
+                    <a:bodyPr/>
+                    <a:lstStyle/>
+                    <a:p>
+                      <a:r>
+                        <a:rPr lang="fi-FI" sz="2400" dirty="0"/>
+                        <a:t>Käyttöliittymän edustapalvelin</a:t>
+                      </a:r>
+                    </a:p>
+                  </a:txBody>
+                  <a:tcPr/>
+                </a:tc>
+                <a:extLst>
+                  <a:ext uri="{0D108BD9-81ED-4DB2-BD59-A6C34878D82A}">
+                    <a16:rowId xmlns:a16="http://schemas.microsoft.com/office/drawing/2014/main" val="10001"/>
+                  </a:ext>
+                </a:extLst>
+              </a:tr>
+              <a:tr h="722339">
+                <a:tc>
+                  <a:txBody>
+                    <a:bodyPr/>
+                    <a:lstStyle/>
+                    <a:p>
+                      <a:r>
+                        <a:rPr lang="fi-FI" sz="2400" dirty="0" err="1"/>
+                        <a:t>xroad-proxy</a:t>
+                      </a:r>
+                      <a:endParaRPr lang="fi-FI" sz="2400" dirty="0"/>
+                    </a:p>
+                  </a:txBody>
+                  <a:tcPr/>
+                </a:tc>
+                <a:tc>
+                  <a:txBody>
+                    <a:bodyPr/>
+                    <a:lstStyle/>
+                    <a:p>
+                      <a:r>
+                        <a:rPr lang="fi-FI" sz="2400" dirty="0"/>
+                        <a:t>Viestien välitys</a:t>
+                      </a:r>
+                    </a:p>
+                  </a:txBody>
+                  <a:tcPr/>
+                </a:tc>
+                <a:extLst>
+                  <a:ext uri="{0D108BD9-81ED-4DB2-BD59-A6C34878D82A}">
+                    <a16:rowId xmlns:a16="http://schemas.microsoft.com/office/drawing/2014/main" val="10002"/>
+                  </a:ext>
+                </a:extLst>
+              </a:tr>
+              <a:tr h="722339">
+                <a:tc>
+                  <a:txBody>
+                    <a:bodyPr/>
+                    <a:lstStyle/>
+                    <a:p>
+                      <a:r>
+                        <a:rPr lang="fi-FI" sz="2400" dirty="0" err="1"/>
+                        <a:t>xroad-signer</a:t>
+                      </a:r>
+                      <a:endParaRPr lang="fi-FI" sz="2400" dirty="0"/>
+                    </a:p>
+                  </a:txBody>
+                  <a:tcPr/>
+                </a:tc>
+                <a:tc>
+                  <a:txBody>
+                    <a:bodyPr/>
+                    <a:lstStyle/>
+                    <a:p>
+                      <a:r>
+                        <a:rPr lang="fi-FI" sz="2400" dirty="0"/>
+                        <a:t>Varmenteiden voimassaolo</a:t>
+                      </a:r>
+                    </a:p>
+                  </a:txBody>
+                  <a:tcPr/>
+                </a:tc>
+                <a:extLst>
+                  <a:ext uri="{0D108BD9-81ED-4DB2-BD59-A6C34878D82A}">
+                    <a16:rowId xmlns:a16="http://schemas.microsoft.com/office/drawing/2014/main" val="10003"/>
+                  </a:ext>
+                </a:extLst>
+              </a:tr>
+              <a:tr h="722339">
+                <a:tc>
+                  <a:txBody>
+                    <a:bodyPr/>
+                    <a:lstStyle/>
+                    <a:p>
+                      <a:r>
+                        <a:rPr lang="fi-FI" sz="2400" dirty="0" err="1"/>
+                        <a:t>xroad-jetty</a:t>
+                      </a:r>
+                      <a:endParaRPr lang="fi-FI" sz="2400" dirty="0"/>
+                    </a:p>
+                  </a:txBody>
+                  <a:tcPr/>
+                </a:tc>
+                <a:tc>
+                  <a:txBody>
+                    <a:bodyPr/>
+                    <a:lstStyle/>
+                    <a:p>
+                      <a:r>
+                        <a:rPr lang="fi-FI" sz="2400" dirty="0"/>
+                        <a:t>Käyttöliittymäsovellus</a:t>
+                      </a:r>
+                    </a:p>
+                  </a:txBody>
+                  <a:tcPr/>
+                </a:tc>
+                <a:extLst>
+                  <a:ext uri="{0D108BD9-81ED-4DB2-BD59-A6C34878D82A}">
+                    <a16:rowId xmlns:a16="http://schemas.microsoft.com/office/drawing/2014/main" val="10004"/>
+                  </a:ext>
+                </a:extLst>
+              </a:tr>
+              <a:tr h="722339">
+                <a:tc>
+                  <a:txBody>
+                    <a:bodyPr/>
+                    <a:lstStyle/>
+                    <a:p>
+                      <a:r>
+                        <a:rPr lang="fi-FI" sz="2400" dirty="0" err="1"/>
+                        <a:t>xroad-confclient</a:t>
+                      </a:r>
+                      <a:endParaRPr lang="fi-FI" sz="2400" dirty="0"/>
+                    </a:p>
+                  </a:txBody>
+                  <a:tcPr/>
+                </a:tc>
+                <a:tc>
+                  <a:txBody>
+                    <a:bodyPr/>
+                    <a:lstStyle/>
+                    <a:p>
+                      <a:r>
+                        <a:rPr lang="fi-FI" sz="2400" dirty="0"/>
+                        <a:t>Keskuskonfiguraation</a:t>
+                      </a:r>
+                      <a:r>
+                        <a:rPr lang="fi-FI" sz="2400" baseline="0" dirty="0"/>
+                        <a:t> päivitys</a:t>
+                      </a:r>
+                      <a:endParaRPr lang="fi-FI" sz="2400" dirty="0"/>
+                    </a:p>
+                  </a:txBody>
+                  <a:tcPr/>
+                </a:tc>
+                <a:extLst>
+                  <a:ext uri="{0D108BD9-81ED-4DB2-BD59-A6C34878D82A}">
+                    <a16:rowId xmlns:a16="http://schemas.microsoft.com/office/drawing/2014/main" val="10005"/>
+                  </a:ext>
+                </a:extLst>
+              </a:tr>
+              <a:tr h="475334">
+                <a:tc>
+                  <a:txBody>
+                    <a:bodyPr/>
+                    <a:lstStyle/>
+                    <a:p>
+                      <a:r>
+                        <a:rPr lang="fi-FI" sz="2400" dirty="0" err="1"/>
+                        <a:t>postgresql</a:t>
+                      </a:r>
+                      <a:endParaRPr lang="fi-FI" sz="2400" dirty="0"/>
+                    </a:p>
+                  </a:txBody>
+                  <a:tcPr/>
+                </a:tc>
+                <a:tc>
+                  <a:txBody>
+                    <a:bodyPr/>
+                    <a:lstStyle/>
+                    <a:p>
+                      <a:r>
+                        <a:rPr lang="fi-FI" sz="2400" dirty="0"/>
+                        <a:t>Tietokanta</a:t>
+                      </a:r>
+                    </a:p>
+                  </a:txBody>
+                  <a:tcPr/>
+                </a:tc>
+                <a:extLst>
+                  <a:ext uri="{0D108BD9-81ED-4DB2-BD59-A6C34878D82A}">
+                    <a16:rowId xmlns:a16="http://schemas.microsoft.com/office/drawing/2014/main" val="10006"/>
+                  </a:ext>
+                </a:extLst>
+              </a:tr>
+            </a:tbl>
+          </a:graphicData>
+        </a:graphic>
+      </p:graphicFrame>
+    </p:spTree>
+    <p:extLst>
+      <p:ext uri="{BB962C8B-B14F-4D97-AF65-F5344CB8AC3E}">
+        <p14:creationId xmlns:p14="http://schemas.microsoft.com/office/powerpoint/2010/main" val="2265636199"/>
+      </p:ext>
+    </p:extLst>
+  </p:cSld>
+  <p:clrMapOvr>
+    <a:masterClrMapping/>
+  </p:clrMapOvr>
+</p:sld>
+</file>
+
+<file path=ppt/slides/slide6.xml><?xml version="1.0" encoding="utf-8"?>
+<p:sld xmlns:a="http://schemas.openxmlformats.org/drawingml/2006/main" xmlns:r="http://schemas.openxmlformats.org/officeDocument/2006/relationships" xmlns:p="http://schemas.openxmlformats.org/presentationml/2006/main">
+  <p:cSld>
+    <p:spTree>
+      <p:nvGrpSpPr>
+        <p:cNvPr id="1" name=""/>
+        <p:cNvGrpSpPr/>
+        <p:nvPr/>
+      </p:nvGrpSpPr>
+      <p:grpSpPr>
+        <a:xfrm>
+          <a:off x="0" y="0"/>
+          <a:ext cx="0" cy="0"/>
+          <a:chOff x="0" y="0"/>
+          <a:chExt cx="0" cy="0"/>
+        </a:xfrm>
+      </p:grpSpPr>
+      <p:sp>
+        <p:nvSpPr>
+          <p:cNvPr id="3" name="Otsikko 2"/>
+          <p:cNvSpPr>
+            <a:spLocks noGrp="1"/>
+          </p:cNvSpPr>
+          <p:nvPr>
+            <p:ph type="title"/>
+          </p:nvPr>
+        </p:nvSpPr>
+        <p:spPr/>
+        <p:txBody>
+          <a:bodyPr/>
+          <a:lstStyle/>
+          <a:p>
+            <a:r>
+              <a:rPr lang="fi-FI" dirty="0"/>
+              <a:t>Valvonta, prosessit ja portit</a:t>
+            </a:r>
+          </a:p>
+        </p:txBody>
+      </p:sp>
+      <p:pic>
+        <p:nvPicPr>
+          <p:cNvPr id="4" name="Sisällön paikkamerkki 3"/>
+          <p:cNvPicPr>
+            <a:picLocks noGrp="1" noChangeAspect="1"/>
+          </p:cNvPicPr>
+          <p:nvPr>
+            <p:ph idx="13"/>
+          </p:nvPr>
+        </p:nvPicPr>
+        <p:blipFill rotWithShape="1">
+          <a:blip r:embed="rId3" cstate="print">
+            <a:extLst>
+              <a:ext uri="{28A0092B-C50C-407E-A947-70E740481C1C}">
+                <a14:useLocalDpi xmlns:a14="http://schemas.microsoft.com/office/drawing/2010/main" val="0"/>
+              </a:ext>
+            </a:extLst>
+          </a:blip>
+          <a:srcRect l="1236" t="1331" r="1541" b="-1"/>
+          <a:stretch/>
+        </p:blipFill>
+        <p:spPr bwMode="auto">
+          <a:xfrm>
+            <a:off x="2071647" y="1790795"/>
+            <a:ext cx="8048706" cy="4885745"/>
+          </a:xfrm>
+          <a:prstGeom prst="rect">
+            <a:avLst/>
+          </a:prstGeom>
+          <a:noFill/>
+          <a:extLst>
+            <a:ext uri="{909E8E84-426E-40DD-AFC4-6F175D3DCCD1}">
+              <a14:hiddenFill xmlns:a14="http://schemas.microsoft.com/office/drawing/2010/main">
+                <a:solidFill>
+                  <a:srgbClr val="FFFFFF"/>
+                </a:solidFill>
+              </a14:hiddenFill>
+            </a:ext>
+          </a:extLst>
+        </p:spPr>
+      </p:pic>
+    </p:spTree>
+    <p:extLst>
+      <p:ext uri="{BB962C8B-B14F-4D97-AF65-F5344CB8AC3E}">
+        <p14:creationId xmlns:p14="http://schemas.microsoft.com/office/powerpoint/2010/main" val="3352745462"/>
+      </p:ext>
+    </p:extLst>
+  </p:cSld>
+  <p:clrMapOvr>
+    <a:masterClrMapping/>
+  </p:clrMapOvr>
+</p:sld>
+</file>
+
+<file path=ppt/slides/slide7.xml><?xml version="1.0" encoding="utf-8"?>
+<p:sld xmlns:a="http://schemas.openxmlformats.org/drawingml/2006/main" xmlns:r="http://schemas.openxmlformats.org/officeDocument/2006/relationships" xmlns:p="http://schemas.openxmlformats.org/presentationml/2006/main">
+  <p:cSld>
+    <p:spTree>
+      <p:nvGrpSpPr>
+        <p:cNvPr id="1" name=""/>
+        <p:cNvGrpSpPr/>
+        <p:nvPr/>
+      </p:nvGrpSpPr>
+      <p:grpSpPr>
+        <a:xfrm>
+          <a:off x="0" y="0"/>
+          <a:ext cx="0" cy="0"/>
+          <a:chOff x="0" y="0"/>
+          <a:chExt cx="0" cy="0"/>
+        </a:xfrm>
+      </p:grpSpPr>
+      <p:sp>
+        <p:nvSpPr>
+          <p:cNvPr id="2" name="Sisällön paikkamerkki 1"/>
+          <p:cNvSpPr>
+            <a:spLocks noGrp="1"/>
+          </p:cNvSpPr>
+          <p:nvPr>
+            <p:ph idx="1"/>
+          </p:nvPr>
+        </p:nvSpPr>
+        <p:spPr/>
+        <p:txBody>
+          <a:bodyPr/>
+          <a:lstStyle/>
+          <a:p>
+            <a:r>
+              <a:rPr lang="fi-FI" dirty="0"/>
+              <a:t>Asennuksen mukana tulee komentorivityökalu </a:t>
+            </a:r>
+            <a:r>
+              <a:rPr lang="fi-FI" b="1" dirty="0" err="1"/>
+              <a:t>signer-console</a:t>
+            </a:r>
+            <a:r>
+              <a:rPr lang="fi-FI" dirty="0"/>
+              <a:t>, jolla PIN-koodin syöttö voidaan tehdä ilman </a:t>
+            </a:r>
+            <a:r>
+              <a:rPr lang="fi-FI" dirty="0" err="1"/>
+              <a:t>web</a:t>
+            </a:r>
+            <a:r>
+              <a:rPr lang="fi-FI" dirty="0"/>
+              <a:t> </a:t>
+            </a:r>
+            <a:r>
+              <a:rPr lang="fi-FI" dirty="0" err="1"/>
+              <a:t>admin</a:t>
+            </a:r>
+            <a:r>
+              <a:rPr lang="fi-FI" dirty="0"/>
+              <a:t> </a:t>
+            </a:r>
+            <a:r>
+              <a:rPr lang="fi-FI" dirty="0" err="1"/>
+              <a:t>UI:ta</a:t>
+            </a:r>
+            <a:endParaRPr lang="fi-FI" dirty="0"/>
+          </a:p>
+          <a:p>
+            <a:r>
+              <a:rPr lang="fi-FI" dirty="0"/>
+              <a:t>Näin voidaan automatisoida PIN-koodin syöttö palvelimen käynnistymisen yhteyteen</a:t>
+            </a:r>
+          </a:p>
+          <a:p>
+            <a:pPr lvl="1"/>
+            <a:r>
+              <a:rPr lang="fi-FI" dirty="0"/>
+              <a:t>Koodi syötettävä aina palvelimen uudelleenkäynnistyksen yhteydessä</a:t>
+            </a:r>
+          </a:p>
+        </p:txBody>
+      </p:sp>
+      <p:sp>
+        <p:nvSpPr>
+          <p:cNvPr id="3" name="Otsikko 2"/>
+          <p:cNvSpPr>
+            <a:spLocks noGrp="1"/>
+          </p:cNvSpPr>
+          <p:nvPr>
+            <p:ph type="title"/>
+          </p:nvPr>
+        </p:nvSpPr>
+        <p:spPr/>
+        <p:txBody>
+          <a:bodyPr/>
+          <a:lstStyle/>
+          <a:p>
+            <a:r>
+              <a:rPr lang="fi-FI" dirty="0"/>
+              <a:t>PIN-koodi</a:t>
+            </a:r>
+          </a:p>
+        </p:txBody>
+      </p:sp>
+    </p:spTree>
+    <p:extLst>
+      <p:ext uri="{BB962C8B-B14F-4D97-AF65-F5344CB8AC3E}">
+        <p14:creationId xmlns:p14="http://schemas.microsoft.com/office/powerpoint/2010/main" val="266621481"/>
+      </p:ext>
+    </p:extLst>
+  </p:cSld>
+  <p:clrMapOvr>
+    <a:masterClrMapping/>
+  </p:clrMapOvr>
+</p:sld>
+</file>
+
+<file path=ppt/slides/slide8.xml><?xml version="1.0" encoding="utf-8"?>
+<p:sld xmlns:a="http://schemas.openxmlformats.org/drawingml/2006/main" xmlns:r="http://schemas.openxmlformats.org/officeDocument/2006/relationships" xmlns:p="http://schemas.openxmlformats.org/presentationml/2006/main">
+  <p:cSld>
+    <p:spTree>
+      <p:nvGrpSpPr>
+        <p:cNvPr id="1" name=""/>
+        <p:cNvGrpSpPr/>
+        <p:nvPr/>
+      </p:nvGrpSpPr>
+      <p:grpSpPr>
+        <a:xfrm>
+          <a:off x="0" y="0"/>
+          <a:ext cx="0" cy="0"/>
+          <a:chOff x="0" y="0"/>
+          <a:chExt cx="0" cy="0"/>
+        </a:xfrm>
+      </p:grpSpPr>
+      <p:sp>
+        <p:nvSpPr>
+          <p:cNvPr id="2" name="Sisällön paikkamerkki 1"/>
+          <p:cNvSpPr>
+            <a:spLocks noGrp="1"/>
+          </p:cNvSpPr>
+          <p:nvPr>
+            <p:ph idx="1"/>
+          </p:nvPr>
+        </p:nvSpPr>
+        <p:spPr/>
+        <p:txBody>
+          <a:bodyPr/>
+          <a:lstStyle/>
+          <a:p>
+            <a:r>
+              <a:rPr lang="fi-FI" dirty="0"/>
+              <a:t>Parametrit ovat hakemistossa:</a:t>
+            </a:r>
+          </a:p>
+          <a:p>
+            <a:pPr marL="0" indent="0">
+              <a:buNone/>
+            </a:pPr>
+            <a:r>
+              <a:rPr lang="fi-FI" b="1" dirty="0"/>
+              <a:t>	</a:t>
+            </a:r>
+            <a:r>
+              <a:rPr lang="fi-FI" b="1" dirty="0">
+                <a:latin typeface="Courier New" panose="02070309020205020404" pitchFamily="49" charset="0"/>
+                <a:cs typeface="Courier New" panose="02070309020205020404" pitchFamily="49" charset="0"/>
+              </a:rPr>
+              <a:t>/</a:t>
+            </a:r>
+            <a:r>
+              <a:rPr lang="fi-FI" b="1" dirty="0" err="1">
+                <a:latin typeface="Courier New" panose="02070309020205020404" pitchFamily="49" charset="0"/>
+                <a:cs typeface="Courier New" panose="02070309020205020404" pitchFamily="49" charset="0"/>
+              </a:rPr>
+              <a:t>etc</a:t>
+            </a:r>
+            <a:r>
+              <a:rPr lang="fi-FI" b="1" dirty="0">
+                <a:latin typeface="Courier New" panose="02070309020205020404" pitchFamily="49" charset="0"/>
+                <a:cs typeface="Courier New" panose="02070309020205020404" pitchFamily="49" charset="0"/>
+              </a:rPr>
+              <a:t>/</a:t>
+            </a:r>
+            <a:r>
+              <a:rPr lang="fi-FI" b="1" dirty="0" err="1">
+                <a:latin typeface="Courier New" panose="02070309020205020404" pitchFamily="49" charset="0"/>
+                <a:cs typeface="Courier New" panose="02070309020205020404" pitchFamily="49" charset="0"/>
+              </a:rPr>
+              <a:t>xroad</a:t>
+            </a:r>
+            <a:r>
+              <a:rPr lang="fi-FI" b="1" dirty="0">
+                <a:latin typeface="Courier New" panose="02070309020205020404" pitchFamily="49" charset="0"/>
+                <a:cs typeface="Courier New" panose="02070309020205020404" pitchFamily="49" charset="0"/>
+              </a:rPr>
+              <a:t>/</a:t>
+            </a:r>
+            <a:r>
+              <a:rPr lang="fi-FI" b="1" dirty="0" err="1">
+                <a:latin typeface="Courier New" panose="02070309020205020404" pitchFamily="49" charset="0"/>
+                <a:cs typeface="Courier New" panose="02070309020205020404" pitchFamily="49" charset="0"/>
+              </a:rPr>
+              <a:t>conf.d</a:t>
+            </a:r>
+            <a:endParaRPr lang="fi-FI" dirty="0">
+              <a:latin typeface="Courier New" panose="02070309020205020404" pitchFamily="49" charset="0"/>
+              <a:cs typeface="Courier New" panose="02070309020205020404" pitchFamily="49" charset="0"/>
+            </a:endParaRPr>
+          </a:p>
+          <a:p>
+            <a:r>
+              <a:rPr lang="fi-FI" dirty="0"/>
+              <a:t>Parametreilla voidaan säätää esimerkiksi käytettyjä tallennushakemistoja ja </a:t>
+            </a:r>
+            <a:r>
+              <a:rPr lang="fi-FI" dirty="0" err="1"/>
+              <a:t>cron</a:t>
+            </a:r>
+            <a:r>
+              <a:rPr lang="fi-FI" dirty="0"/>
+              <a:t> ajastuksia mm. </a:t>
+            </a:r>
+            <a:r>
+              <a:rPr lang="fi-FI" dirty="0" err="1"/>
+              <a:t>messagelogien</a:t>
+            </a:r>
+            <a:r>
+              <a:rPr lang="fi-FI" dirty="0"/>
+              <a:t> purkamiseen kannasta</a:t>
+            </a:r>
+          </a:p>
+          <a:p>
+            <a:r>
+              <a:rPr lang="fi-FI" dirty="0"/>
+              <a:t>Omat parametrit eri komponenteille</a:t>
+            </a:r>
+          </a:p>
+          <a:p>
+            <a:pPr lvl="1"/>
+            <a:r>
+              <a:rPr lang="fi-FI" dirty="0"/>
+              <a:t>Proxy.ini, signer.ini, common.ini...</a:t>
+            </a:r>
+          </a:p>
+          <a:p>
+            <a:pPr lvl="1"/>
+            <a:r>
+              <a:rPr lang="fi-FI" dirty="0"/>
+              <a:t>Paikalliset muutokset tehdään</a:t>
+            </a:r>
+            <a:r>
+              <a:rPr lang="fi-FI" b="1" dirty="0"/>
+              <a:t> local.ini </a:t>
+            </a:r>
+            <a:r>
+              <a:rPr lang="fi-FI" dirty="0"/>
+              <a:t>tiedostoon</a:t>
+            </a:r>
+          </a:p>
+          <a:p>
+            <a:pPr marL="0" indent="0">
+              <a:buNone/>
+            </a:pPr>
+            <a:endParaRPr lang="fi-FI" dirty="0"/>
+          </a:p>
+        </p:txBody>
+      </p:sp>
+      <p:sp>
+        <p:nvSpPr>
+          <p:cNvPr id="3" name="Otsikko 2"/>
+          <p:cNvSpPr>
+            <a:spLocks noGrp="1"/>
+          </p:cNvSpPr>
+          <p:nvPr>
+            <p:ph type="title"/>
+          </p:nvPr>
+        </p:nvSpPr>
+        <p:spPr/>
+        <p:txBody>
+          <a:bodyPr/>
+          <a:lstStyle/>
+          <a:p>
+            <a:r>
+              <a:rPr lang="fi-FI" dirty="0"/>
+              <a:t>Konfiguraatioparametrit</a:t>
+            </a:r>
+          </a:p>
+        </p:txBody>
+      </p:sp>
+    </p:spTree>
+    <p:extLst>
+      <p:ext uri="{BB962C8B-B14F-4D97-AF65-F5344CB8AC3E}">
+        <p14:creationId xmlns:p14="http://schemas.microsoft.com/office/powerpoint/2010/main" val="4049760494"/>
+      </p:ext>
+    </p:extLst>
+  </p:cSld>
+  <p:clrMapOvr>
+    <a:masterClrMapping/>
+  </p:clrMapOvr>
+</p:sld>
+</file>
+
+<file path=ppt/slides/slide9.xml><?xml version="1.0" encoding="utf-8"?>
+<p:sld xmlns:a="http://schemas.openxmlformats.org/drawingml/2006/main" xmlns:r="http://schemas.openxmlformats.org/officeDocument/2006/relationships" xmlns:p="http://schemas.openxmlformats.org/presentationml/2006/main">
+  <p:cSld>
+    <p:spTree>
+      <p:nvGrpSpPr>
+        <p:cNvPr id="1" name=""/>
+        <p:cNvGrpSpPr/>
+        <p:nvPr/>
+      </p:nvGrpSpPr>
+      <p:grpSpPr>
+        <a:xfrm>
+          <a:off x="0" y="0"/>
+          <a:ext cx="0" cy="0"/>
+          <a:chOff x="0" y="0"/>
+          <a:chExt cx="0" cy="0"/>
+        </a:xfrm>
+      </p:grpSpPr>
+      <p:sp>
+        <p:nvSpPr>
+          <p:cNvPr id="4" name="Tekstin paikkamerkki 3"/>
+          <p:cNvSpPr>
+            <a:spLocks noGrp="1"/>
+          </p:cNvSpPr>
+          <p:nvPr>
+            <p:ph idx="1"/>
+          </p:nvPr>
+        </p:nvSpPr>
+        <p:spPr/>
+        <p:txBody>
+          <a:bodyPr/>
+          <a:lstStyle/>
+          <a:p>
+            <a:r>
+              <a:rPr lang="fi-FI" dirty="0"/>
+              <a:t>Liitetiedostot tallentuvat väliaikaisesti liityntäpalvelimen levylle</a:t>
+            </a:r>
+          </a:p>
+          <a:p>
+            <a:r>
+              <a:rPr lang="fi-FI" dirty="0"/>
+              <a:t>Levytila asettaa maksimin käsiteltävien liitteiden koolle</a:t>
+            </a:r>
+          </a:p>
+          <a:p>
+            <a:endParaRPr lang="fi-FI" dirty="0"/>
+          </a:p>
+          <a:p>
+            <a:endParaRPr lang="fi-FI" dirty="0"/>
+          </a:p>
+          <a:p>
+            <a:endParaRPr lang="fi-FI" dirty="0"/>
+          </a:p>
+        </p:txBody>
+      </p:sp>
+      <p:sp>
+        <p:nvSpPr>
+          <p:cNvPr id="3" name="Otsikko 2"/>
+          <p:cNvSpPr>
+            <a:spLocks noGrp="1"/>
+          </p:cNvSpPr>
+          <p:nvPr>
+            <p:ph type="title"/>
+          </p:nvPr>
+        </p:nvSpPr>
+        <p:spPr/>
+        <p:txBody>
+          <a:bodyPr/>
+          <a:lstStyle/>
+          <a:p>
+            <a:r>
+              <a:rPr lang="fi-FI" dirty="0"/>
+              <a:t>Levytila</a:t>
+            </a:r>
+          </a:p>
+        </p:txBody>
+      </p:sp>
+      <p:pic>
+        <p:nvPicPr>
+          <p:cNvPr id="2" name="Picture 1"/>
+          <p:cNvPicPr>
+            <a:picLocks noChangeAspect="1"/>
+          </p:cNvPicPr>
+          <p:nvPr/>
+        </p:nvPicPr>
+        <p:blipFill>
+          <a:blip r:embed="rId2"/>
+          <a:stretch>
+            <a:fillRect/>
+          </a:stretch>
+        </p:blipFill>
+        <p:spPr>
+          <a:xfrm>
+            <a:off x="3088519" y="3093037"/>
+            <a:ext cx="6014961" cy="3619987"/>
+          </a:xfrm>
+          <a:prstGeom prst="rect">
+            <a:avLst/>
+          </a:prstGeom>
+        </p:spPr>
+      </p:pic>
+    </p:spTree>
+    <p:extLst>
+      <p:ext uri="{BB962C8B-B14F-4D97-AF65-F5344CB8AC3E}">
+        <p14:creationId xmlns:p14="http://schemas.microsoft.com/office/powerpoint/2010/main" val="3799199240"/>
       </p:ext>
     </p:extLst>
   </p:cSld>

</xml_diff>